<commit_message>
Mise a jour du projet
</commit_message>
<xml_diff>
--- a/1_Laboratoire MLP/projet1.pptx
+++ b/1_Laboratoire MLP/projet1.pptx
@@ -118,7 +118,7 @@
 <file path=ppt/revisionInfo.xml><?xml version="1.0" encoding="utf-8"?>
 <p1510:revInfo xmlns:a="http://schemas.openxmlformats.org/drawingml/2006/main" xmlns:r="http://schemas.openxmlformats.org/officeDocument/2006/relationships" xmlns:p1510="http://schemas.microsoft.com/office/powerpoint/2015/10/main">
   <p1510:revLst>
-    <p1510:client id="{F96CE3ED-AA27-400A-A742-2C84F99BCB89}" v="17" dt="2026-01-30T11:11:53.358"/>
+    <p1510:client id="{F96CE3ED-AA27-400A-A742-2C84F99BCB89}" v="32" dt="2026-01-31T20:03:38.973"/>
   </p1510:revLst>
 </p1510:revInfo>
 </file>
@@ -128,7 +128,7 @@
   <pc:docChgLst>
     <pc:chgData name="Amouzou, Komi Mekaeli" userId="020e202c-3c4c-4e52-9bfa-205f5f67fc05" providerId="ADAL" clId="{DFF75377-3DF0-4A60-90BA-EBCBE8F9083E}"/>
     <pc:docChg chg="undo custSel addSld delSld modSld sldOrd">
-      <pc:chgData name="Amouzou, Komi Mekaeli" userId="020e202c-3c4c-4e52-9bfa-205f5f67fc05" providerId="ADAL" clId="{DFF75377-3DF0-4A60-90BA-EBCBE8F9083E}" dt="2026-01-30T15:39:58.367" v="5369" actId="20577"/>
+      <pc:chgData name="Amouzou, Komi Mekaeli" userId="020e202c-3c4c-4e52-9bfa-205f5f67fc05" providerId="ADAL" clId="{DFF75377-3DF0-4A60-90BA-EBCBE8F9083E}" dt="2026-01-31T20:09:01.118" v="5527" actId="313"/>
       <pc:docMkLst>
         <pc:docMk/>
       </pc:docMkLst>
@@ -378,14 +378,6 @@
             <ac:spMk id="97" creationId="{D1DDCC93-84C6-4860-67D3-8E9E2824025B}"/>
           </ac:spMkLst>
         </pc:spChg>
-        <pc:spChg chg="add del mod">
-          <ac:chgData name="Amouzou, Komi Mekaeli" userId="020e202c-3c4c-4e52-9bfa-205f5f67fc05" providerId="ADAL" clId="{DFF75377-3DF0-4A60-90BA-EBCBE8F9083E}" dt="2026-01-29T03:23:41.507" v="3414" actId="21"/>
-          <ac:spMkLst>
-            <pc:docMk/>
-            <pc:sldMk cId="3394512739" sldId="256"/>
-            <ac:spMk id="112" creationId="{7F342702-0CB6-9C9A-D992-CC8CD8AE0795}"/>
-          </ac:spMkLst>
-        </pc:spChg>
         <pc:spChg chg="add mod">
           <ac:chgData name="Amouzou, Komi Mekaeli" userId="020e202c-3c4c-4e52-9bfa-205f5f67fc05" providerId="ADAL" clId="{DFF75377-3DF0-4A60-90BA-EBCBE8F9083E}" dt="2026-01-28T08:00:54.778" v="2305" actId="164"/>
           <ac:spMkLst>
@@ -729,446 +721,6 @@
           <pc:docMk/>
           <pc:sldMk cId="3433642152" sldId="257"/>
         </pc:sldMkLst>
-        <pc:spChg chg="add mod topLvl">
-          <ac:chgData name="Amouzou, Komi Mekaeli" userId="020e202c-3c4c-4e52-9bfa-205f5f67fc05" providerId="ADAL" clId="{DFF75377-3DF0-4A60-90BA-EBCBE8F9083E}" dt="2026-01-29T03:45:22.326" v="3668" actId="14100"/>
-          <ac:spMkLst>
-            <pc:docMk/>
-            <pc:sldMk cId="3433642152" sldId="257"/>
-            <ac:spMk id="2" creationId="{0A116B3B-7A2C-01BC-43EB-37331D56DBD3}"/>
-          </ac:spMkLst>
-        </pc:spChg>
-        <pc:spChg chg="add mod topLvl">
-          <ac:chgData name="Amouzou, Komi Mekaeli" userId="020e202c-3c4c-4e52-9bfa-205f5f67fc05" providerId="ADAL" clId="{DFF75377-3DF0-4A60-90BA-EBCBE8F9083E}" dt="2026-01-29T02:49:48.930" v="2659" actId="165"/>
-          <ac:spMkLst>
-            <pc:docMk/>
-            <pc:sldMk cId="3433642152" sldId="257"/>
-            <ac:spMk id="3" creationId="{E93377C0-8EED-593A-1658-3630FAF7944F}"/>
-          </ac:spMkLst>
-        </pc:spChg>
-        <pc:spChg chg="add mod">
-          <ac:chgData name="Amouzou, Komi Mekaeli" userId="020e202c-3c4c-4e52-9bfa-205f5f67fc05" providerId="ADAL" clId="{DFF75377-3DF0-4A60-90BA-EBCBE8F9083E}" dt="2026-01-29T03:49:09.119" v="3726" actId="1076"/>
-          <ac:spMkLst>
-            <pc:docMk/>
-            <pc:sldMk cId="3433642152" sldId="257"/>
-            <ac:spMk id="4" creationId="{B618F1F6-76EB-7C9E-F78A-56D4BAE4C15F}"/>
-          </ac:spMkLst>
-        </pc:spChg>
-        <pc:spChg chg="add del mod">
-          <ac:chgData name="Amouzou, Komi Mekaeli" userId="020e202c-3c4c-4e52-9bfa-205f5f67fc05" providerId="ADAL" clId="{DFF75377-3DF0-4A60-90BA-EBCBE8F9083E}" dt="2026-01-29T02:37:12.789" v="2395" actId="478"/>
-          <ac:spMkLst>
-            <pc:docMk/>
-            <pc:sldMk cId="3433642152" sldId="257"/>
-            <ac:spMk id="5" creationId="{21FCD1B7-453E-6083-9D7A-5D9EEF43E228}"/>
-          </ac:spMkLst>
-        </pc:spChg>
-        <pc:spChg chg="add mod topLvl">
-          <ac:chgData name="Amouzou, Komi Mekaeli" userId="020e202c-3c4c-4e52-9bfa-205f5f67fc05" providerId="ADAL" clId="{DFF75377-3DF0-4A60-90BA-EBCBE8F9083E}" dt="2026-01-29T02:49:48.930" v="2659" actId="165"/>
-          <ac:spMkLst>
-            <pc:docMk/>
-            <pc:sldMk cId="3433642152" sldId="257"/>
-            <ac:spMk id="6" creationId="{D13F53A9-E61B-ED6D-6298-BA06A577BB2D}"/>
-          </ac:spMkLst>
-        </pc:spChg>
-        <pc:spChg chg="add mod topLvl">
-          <ac:chgData name="Amouzou, Komi Mekaeli" userId="020e202c-3c4c-4e52-9bfa-205f5f67fc05" providerId="ADAL" clId="{DFF75377-3DF0-4A60-90BA-EBCBE8F9083E}" dt="2026-01-29T03:45:31.547" v="3689" actId="1038"/>
-          <ac:spMkLst>
-            <pc:docMk/>
-            <pc:sldMk cId="3433642152" sldId="257"/>
-            <ac:spMk id="9" creationId="{CF7035FF-7A59-A7C6-1982-BDD327756765}"/>
-          </ac:spMkLst>
-        </pc:spChg>
-        <pc:spChg chg="add del mod">
-          <ac:chgData name="Amouzou, Komi Mekaeli" userId="020e202c-3c4c-4e52-9bfa-205f5f67fc05" providerId="ADAL" clId="{DFF75377-3DF0-4A60-90BA-EBCBE8F9083E}" dt="2026-01-29T03:09:27.022" v="3160" actId="478"/>
-          <ac:spMkLst>
-            <pc:docMk/>
-            <pc:sldMk cId="3433642152" sldId="257"/>
-            <ac:spMk id="10" creationId="{51CDBC0B-F538-164B-C269-42E077E3E799}"/>
-          </ac:spMkLst>
-        </pc:spChg>
-        <pc:spChg chg="add del mod">
-          <ac:chgData name="Amouzou, Komi Mekaeli" userId="020e202c-3c4c-4e52-9bfa-205f5f67fc05" providerId="ADAL" clId="{DFF75377-3DF0-4A60-90BA-EBCBE8F9083E}" dt="2026-01-29T03:09:28.027" v="3161" actId="478"/>
-          <ac:spMkLst>
-            <pc:docMk/>
-            <pc:sldMk cId="3433642152" sldId="257"/>
-            <ac:spMk id="11" creationId="{DD36B586-0A95-E9C6-A9E8-FD0FA669A38E}"/>
-          </ac:spMkLst>
-        </pc:spChg>
-        <pc:spChg chg="add mod">
-          <ac:chgData name="Amouzou, Komi Mekaeli" userId="020e202c-3c4c-4e52-9bfa-205f5f67fc05" providerId="ADAL" clId="{DFF75377-3DF0-4A60-90BA-EBCBE8F9083E}" dt="2026-01-29T02:45:41.142" v="2568" actId="164"/>
-          <ac:spMkLst>
-            <pc:docMk/>
-            <pc:sldMk cId="3433642152" sldId="257"/>
-            <ac:spMk id="12" creationId="{F9B7C6D9-30E8-239B-5403-377E1BA573D5}"/>
-          </ac:spMkLst>
-        </pc:spChg>
-        <pc:spChg chg="add mod">
-          <ac:chgData name="Amouzou, Komi Mekaeli" userId="020e202c-3c4c-4e52-9bfa-205f5f67fc05" providerId="ADAL" clId="{DFF75377-3DF0-4A60-90BA-EBCBE8F9083E}" dt="2026-01-29T02:45:41.142" v="2568" actId="164"/>
-          <ac:spMkLst>
-            <pc:docMk/>
-            <pc:sldMk cId="3433642152" sldId="257"/>
-            <ac:spMk id="13" creationId="{F026EDF9-4EB3-220E-8DF4-5551A556449C}"/>
-          </ac:spMkLst>
-        </pc:spChg>
-        <pc:spChg chg="add mod">
-          <ac:chgData name="Amouzou, Komi Mekaeli" userId="020e202c-3c4c-4e52-9bfa-205f5f67fc05" providerId="ADAL" clId="{DFF75377-3DF0-4A60-90BA-EBCBE8F9083E}" dt="2026-01-29T03:13:07.522" v="3165" actId="13926"/>
-          <ac:spMkLst>
-            <pc:docMk/>
-            <pc:sldMk cId="3433642152" sldId="257"/>
-            <ac:spMk id="14" creationId="{8D2A7014-EC75-3ACD-3664-664E6F932F21}"/>
-          </ac:spMkLst>
-        </pc:spChg>
-        <pc:spChg chg="add mod">
-          <ac:chgData name="Amouzou, Komi Mekaeli" userId="020e202c-3c4c-4e52-9bfa-205f5f67fc05" providerId="ADAL" clId="{DFF75377-3DF0-4A60-90BA-EBCBE8F9083E}" dt="2026-01-29T03:11:38.495" v="3162" actId="13926"/>
-          <ac:spMkLst>
-            <pc:docMk/>
-            <pc:sldMk cId="3433642152" sldId="257"/>
-            <ac:spMk id="21" creationId="{1D502E00-5537-A741-5E92-F9556651A891}"/>
-          </ac:spMkLst>
-        </pc:spChg>
-        <pc:spChg chg="mod">
-          <ac:chgData name="Amouzou, Komi Mekaeli" userId="020e202c-3c4c-4e52-9bfa-205f5f67fc05" providerId="ADAL" clId="{DFF75377-3DF0-4A60-90BA-EBCBE8F9083E}" dt="2026-01-29T02:53:14.770" v="2750" actId="313"/>
-          <ac:spMkLst>
-            <pc:docMk/>
-            <pc:sldMk cId="3433642152" sldId="257"/>
-            <ac:spMk id="23" creationId="{637FCED1-55C6-6948-7AB3-3793BB8CE89B}"/>
-          </ac:spMkLst>
-        </pc:spChg>
-        <pc:spChg chg="mod">
-          <ac:chgData name="Amouzou, Komi Mekaeli" userId="020e202c-3c4c-4e52-9bfa-205f5f67fc05" providerId="ADAL" clId="{DFF75377-3DF0-4A60-90BA-EBCBE8F9083E}" dt="2026-01-29T02:51:13.583" v="2665"/>
-          <ac:spMkLst>
-            <pc:docMk/>
-            <pc:sldMk cId="3433642152" sldId="257"/>
-            <ac:spMk id="24" creationId="{8DF524D2-2781-877F-FF17-D75C120175D5}"/>
-          </ac:spMkLst>
-        </pc:spChg>
-        <pc:spChg chg="add del mod">
-          <ac:chgData name="Amouzou, Komi Mekaeli" userId="020e202c-3c4c-4e52-9bfa-205f5f67fc05" providerId="ADAL" clId="{DFF75377-3DF0-4A60-90BA-EBCBE8F9083E}" dt="2026-01-29T02:51:51.095" v="2680" actId="20577"/>
-          <ac:spMkLst>
-            <pc:docMk/>
-            <pc:sldMk cId="3433642152" sldId="257"/>
-            <ac:spMk id="25" creationId="{F0A8EAE0-91CF-6C91-E701-3FF312A242C6}"/>
-          </ac:spMkLst>
-        </pc:spChg>
-        <pc:spChg chg="add mod">
-          <ac:chgData name="Amouzou, Komi Mekaeli" userId="020e202c-3c4c-4e52-9bfa-205f5f67fc05" providerId="ADAL" clId="{DFF75377-3DF0-4A60-90BA-EBCBE8F9083E}" dt="2026-01-29T02:56:11.871" v="2817" actId="20577"/>
-          <ac:spMkLst>
-            <pc:docMk/>
-            <pc:sldMk cId="3433642152" sldId="257"/>
-            <ac:spMk id="27" creationId="{9096BD48-5C80-0B03-A85D-48E75B7348FC}"/>
-          </ac:spMkLst>
-        </pc:spChg>
-        <pc:spChg chg="mod">
-          <ac:chgData name="Amouzou, Komi Mekaeli" userId="020e202c-3c4c-4e52-9bfa-205f5f67fc05" providerId="ADAL" clId="{DFF75377-3DF0-4A60-90BA-EBCBE8F9083E}" dt="2026-01-29T02:59:08.696" v="2883" actId="20577"/>
-          <ac:spMkLst>
-            <pc:docMk/>
-            <pc:sldMk cId="3433642152" sldId="257"/>
-            <ac:spMk id="55" creationId="{C231CE5E-31E0-65A7-0307-D637050EAF51}"/>
-          </ac:spMkLst>
-        </pc:spChg>
-        <pc:spChg chg="mod">
-          <ac:chgData name="Amouzou, Komi Mekaeli" userId="020e202c-3c4c-4e52-9bfa-205f5f67fc05" providerId="ADAL" clId="{DFF75377-3DF0-4A60-90BA-EBCBE8F9083E}" dt="2026-01-29T02:56:54.576" v="2823" actId="571"/>
-          <ac:spMkLst>
-            <pc:docMk/>
-            <pc:sldMk cId="3433642152" sldId="257"/>
-            <ac:spMk id="56" creationId="{0BDD7426-4FE2-6682-4041-10ED68AE7FD8}"/>
-          </ac:spMkLst>
-        </pc:spChg>
-        <pc:spChg chg="mod">
-          <ac:chgData name="Amouzou, Komi Mekaeli" userId="020e202c-3c4c-4e52-9bfa-205f5f67fc05" providerId="ADAL" clId="{DFF75377-3DF0-4A60-90BA-EBCBE8F9083E}" dt="2026-01-29T07:11:59.481" v="3761" actId="20577"/>
-          <ac:spMkLst>
-            <pc:docMk/>
-            <pc:sldMk cId="3433642152" sldId="257"/>
-            <ac:spMk id="57" creationId="{99CFE76C-B35A-8288-CFEC-CFB69D3DA326}"/>
-          </ac:spMkLst>
-        </pc:spChg>
-        <pc:spChg chg="mod">
-          <ac:chgData name="Amouzou, Komi Mekaeli" userId="020e202c-3c4c-4e52-9bfa-205f5f67fc05" providerId="ADAL" clId="{DFF75377-3DF0-4A60-90BA-EBCBE8F9083E}" dt="2026-01-29T03:01:41.497" v="3007" actId="20577"/>
-          <ac:spMkLst>
-            <pc:docMk/>
-            <pc:sldMk cId="3433642152" sldId="257"/>
-            <ac:spMk id="60" creationId="{4E25876C-2284-A141-B49C-2C34C45FF029}"/>
-          </ac:spMkLst>
-        </pc:spChg>
-        <pc:spChg chg="mod">
-          <ac:chgData name="Amouzou, Komi Mekaeli" userId="020e202c-3c4c-4e52-9bfa-205f5f67fc05" providerId="ADAL" clId="{DFF75377-3DF0-4A60-90BA-EBCBE8F9083E}" dt="2026-01-29T02:59:46.020" v="2884"/>
-          <ac:spMkLst>
-            <pc:docMk/>
-            <pc:sldMk cId="3433642152" sldId="257"/>
-            <ac:spMk id="61" creationId="{69093570-0BF0-8BBA-6F10-20F0BCED57A3}"/>
-          </ac:spMkLst>
-        </pc:spChg>
-        <pc:spChg chg="mod">
-          <ac:chgData name="Amouzou, Komi Mekaeli" userId="020e202c-3c4c-4e52-9bfa-205f5f67fc05" providerId="ADAL" clId="{DFF75377-3DF0-4A60-90BA-EBCBE8F9083E}" dt="2026-01-29T07:10:19.065" v="3745" actId="20577"/>
-          <ac:spMkLst>
-            <pc:docMk/>
-            <pc:sldMk cId="3433642152" sldId="257"/>
-            <ac:spMk id="62" creationId="{A8EE367D-2765-56D8-0BB9-8BB1EB03EB66}"/>
-          </ac:spMkLst>
-        </pc:spChg>
-        <pc:spChg chg="mod">
-          <ac:chgData name="Amouzou, Komi Mekaeli" userId="020e202c-3c4c-4e52-9bfa-205f5f67fc05" providerId="ADAL" clId="{DFF75377-3DF0-4A60-90BA-EBCBE8F9083E}" dt="2026-01-29T03:04:58.460" v="3076" actId="5793"/>
-          <ac:spMkLst>
-            <pc:docMk/>
-            <pc:sldMk cId="3433642152" sldId="257"/>
-            <ac:spMk id="67" creationId="{3375BB3E-C3BB-E749-DA76-8A9BF8BB08A4}"/>
-          </ac:spMkLst>
-        </pc:spChg>
-        <pc:spChg chg="mod">
-          <ac:chgData name="Amouzou, Komi Mekaeli" userId="020e202c-3c4c-4e52-9bfa-205f5f67fc05" providerId="ADAL" clId="{DFF75377-3DF0-4A60-90BA-EBCBE8F9083E}" dt="2026-01-29T03:03:21.148" v="3009"/>
-          <ac:spMkLst>
-            <pc:docMk/>
-            <pc:sldMk cId="3433642152" sldId="257"/>
-            <ac:spMk id="68" creationId="{E7B70C03-33A6-B1AA-4015-B1D2B746DFD0}"/>
-          </ac:spMkLst>
-        </pc:spChg>
-        <pc:spChg chg="mod">
-          <ac:chgData name="Amouzou, Komi Mekaeli" userId="020e202c-3c4c-4e52-9bfa-205f5f67fc05" providerId="ADAL" clId="{DFF75377-3DF0-4A60-90BA-EBCBE8F9083E}" dt="2026-01-29T03:12:48.405" v="3164" actId="13926"/>
-          <ac:spMkLst>
-            <pc:docMk/>
-            <pc:sldMk cId="3433642152" sldId="257"/>
-            <ac:spMk id="69" creationId="{2F1DFA9A-6A5B-83AF-5C78-9044C1F6825F}"/>
-          </ac:spMkLst>
-        </pc:spChg>
-        <pc:spChg chg="mod topLvl">
-          <ac:chgData name="Amouzou, Komi Mekaeli" userId="020e202c-3c4c-4e52-9bfa-205f5f67fc05" providerId="ADAL" clId="{DFF75377-3DF0-4A60-90BA-EBCBE8F9083E}" dt="2026-01-29T03:48:28.733" v="3723" actId="164"/>
-          <ac:spMkLst>
-            <pc:docMk/>
-            <pc:sldMk cId="3433642152" sldId="257"/>
-            <ac:spMk id="77" creationId="{6C2D7495-FA18-24EE-9DAC-9113B4E66675}"/>
-          </ac:spMkLst>
-        </pc:spChg>
-        <pc:spChg chg="mod topLvl">
-          <ac:chgData name="Amouzou, Komi Mekaeli" userId="020e202c-3c4c-4e52-9bfa-205f5f67fc05" providerId="ADAL" clId="{DFF75377-3DF0-4A60-90BA-EBCBE8F9083E}" dt="2026-01-29T03:48:28.733" v="3723" actId="164"/>
-          <ac:spMkLst>
-            <pc:docMk/>
-            <pc:sldMk cId="3433642152" sldId="257"/>
-            <ac:spMk id="78" creationId="{83B2AF0D-C998-32C0-1DF7-35457CDD1A6C}"/>
-          </ac:spMkLst>
-        </pc:spChg>
-        <pc:spChg chg="mod topLvl">
-          <ac:chgData name="Amouzou, Komi Mekaeli" userId="020e202c-3c4c-4e52-9bfa-205f5f67fc05" providerId="ADAL" clId="{DFF75377-3DF0-4A60-90BA-EBCBE8F9083E}" dt="2026-01-29T03:48:28.733" v="3723" actId="164"/>
-          <ac:spMkLst>
-            <pc:docMk/>
-            <pc:sldMk cId="3433642152" sldId="257"/>
-            <ac:spMk id="79" creationId="{08588C15-D180-57EB-9F1C-5A107ED6802E}"/>
-          </ac:spMkLst>
-        </pc:spChg>
-        <pc:spChg chg="add mod">
-          <ac:chgData name="Amouzou, Komi Mekaeli" userId="020e202c-3c4c-4e52-9bfa-205f5f67fc05" providerId="ADAL" clId="{DFF75377-3DF0-4A60-90BA-EBCBE8F9083E}" dt="2026-01-29T03:49:21.690" v="3727" actId="1076"/>
-          <ac:spMkLst>
-            <pc:docMk/>
-            <pc:sldMk cId="3433642152" sldId="257"/>
-            <ac:spMk id="83" creationId="{84EA58A7-30E3-A114-2CA1-619E38CC48C6}"/>
-          </ac:spMkLst>
-        </pc:spChg>
-        <pc:spChg chg="add mod">
-          <ac:chgData name="Amouzou, Komi Mekaeli" userId="020e202c-3c4c-4e52-9bfa-205f5f67fc05" providerId="ADAL" clId="{DFF75377-3DF0-4A60-90BA-EBCBE8F9083E}" dt="2026-01-29T03:47:20.859" v="3715" actId="1035"/>
-          <ac:spMkLst>
-            <pc:docMk/>
-            <pc:sldMk cId="3433642152" sldId="257"/>
-            <ac:spMk id="85" creationId="{977A5EA4-A17D-C76A-EE5D-C79C5350B09D}"/>
-          </ac:spMkLst>
-        </pc:spChg>
-        <pc:spChg chg="add del mod">
-          <ac:chgData name="Amouzou, Komi Mekaeli" userId="020e202c-3c4c-4e52-9bfa-205f5f67fc05" providerId="ADAL" clId="{DFF75377-3DF0-4A60-90BA-EBCBE8F9083E}" dt="2026-01-29T03:48:59.919" v="3725" actId="1076"/>
-          <ac:spMkLst>
-            <pc:docMk/>
-            <pc:sldMk cId="3433642152" sldId="257"/>
-            <ac:spMk id="112" creationId="{7F342702-0CB6-9C9A-D992-CC8CD8AE0795}"/>
-          </ac:spMkLst>
-        </pc:spChg>
-        <pc:grpChg chg="add mod">
-          <ac:chgData name="Amouzou, Komi Mekaeli" userId="020e202c-3c4c-4e52-9bfa-205f5f67fc05" providerId="ADAL" clId="{DFF75377-3DF0-4A60-90BA-EBCBE8F9083E}" dt="2026-01-29T02:47:10.639" v="2586" actId="1076"/>
-          <ac:grpSpMkLst>
-            <pc:docMk/>
-            <pc:sldMk cId="3433642152" sldId="257"/>
-            <ac:grpSpMk id="15" creationId="{746B401D-022A-7575-CD87-F63B624F2FBC}"/>
-          </ac:grpSpMkLst>
-        </pc:grpChg>
-        <pc:grpChg chg="add del mod">
-          <ac:chgData name="Amouzou, Komi Mekaeli" userId="020e202c-3c4c-4e52-9bfa-205f5f67fc05" providerId="ADAL" clId="{DFF75377-3DF0-4A60-90BA-EBCBE8F9083E}" dt="2026-01-29T02:49:48.930" v="2659" actId="165"/>
-          <ac:grpSpMkLst>
-            <pc:docMk/>
-            <pc:sldMk cId="3433642152" sldId="257"/>
-            <ac:grpSpMk id="16" creationId="{896EEE5D-5676-219D-191E-2698EDD7587E}"/>
-          </ac:grpSpMkLst>
-        </pc:grpChg>
-        <pc:grpChg chg="add mod">
-          <ac:chgData name="Amouzou, Komi Mekaeli" userId="020e202c-3c4c-4e52-9bfa-205f5f67fc05" providerId="ADAL" clId="{DFF75377-3DF0-4A60-90BA-EBCBE8F9083E}" dt="2026-01-29T02:51:16.981" v="2666" actId="1076"/>
-          <ac:grpSpMkLst>
-            <pc:docMk/>
-            <pc:sldMk cId="3433642152" sldId="257"/>
-            <ac:grpSpMk id="22" creationId="{B669D2B5-0760-670F-37FD-2FB4FB65818A}"/>
-          </ac:grpSpMkLst>
-        </pc:grpChg>
-        <pc:grpChg chg="del">
-          <ac:chgData name="Amouzou, Komi Mekaeli" userId="020e202c-3c4c-4e52-9bfa-205f5f67fc05" providerId="ADAL" clId="{DFF75377-3DF0-4A60-90BA-EBCBE8F9083E}" dt="2026-01-29T02:33:45.747" v="2327" actId="478"/>
-          <ac:grpSpMkLst>
-            <pc:docMk/>
-            <pc:sldMk cId="3433642152" sldId="257"/>
-            <ac:grpSpMk id="28" creationId="{33524C4E-46BB-D3E0-58BF-4BD86F48C88F}"/>
-          </ac:grpSpMkLst>
-        </pc:grpChg>
-        <pc:grpChg chg="del">
-          <ac:chgData name="Amouzou, Komi Mekaeli" userId="020e202c-3c4c-4e52-9bfa-205f5f67fc05" providerId="ADAL" clId="{DFF75377-3DF0-4A60-90BA-EBCBE8F9083E}" dt="2026-01-29T02:33:45.747" v="2327" actId="478"/>
-          <ac:grpSpMkLst>
-            <pc:docMk/>
-            <pc:sldMk cId="3433642152" sldId="257"/>
-            <ac:grpSpMk id="31" creationId="{D55A6F64-3A0B-4D64-F429-38F6269B7B98}"/>
-          </ac:grpSpMkLst>
-        </pc:grpChg>
-        <pc:grpChg chg="del">
-          <ac:chgData name="Amouzou, Komi Mekaeli" userId="020e202c-3c4c-4e52-9bfa-205f5f67fc05" providerId="ADAL" clId="{DFF75377-3DF0-4A60-90BA-EBCBE8F9083E}" dt="2026-01-29T02:33:45.747" v="2327" actId="478"/>
-          <ac:grpSpMkLst>
-            <pc:docMk/>
-            <pc:sldMk cId="3433642152" sldId="257"/>
-            <ac:grpSpMk id="34" creationId="{27F76E75-3C0E-E7C1-9BAA-715975BA2F9C}"/>
-          </ac:grpSpMkLst>
-        </pc:grpChg>
-        <pc:grpChg chg="del">
-          <ac:chgData name="Amouzou, Komi Mekaeli" userId="020e202c-3c4c-4e52-9bfa-205f5f67fc05" providerId="ADAL" clId="{DFF75377-3DF0-4A60-90BA-EBCBE8F9083E}" dt="2026-01-29T02:33:45.747" v="2327" actId="478"/>
-          <ac:grpSpMkLst>
-            <pc:docMk/>
-            <pc:sldMk cId="3433642152" sldId="257"/>
-            <ac:grpSpMk id="37" creationId="{49B58999-E70E-6ED8-FE3E-765DA95FE4DD}"/>
-          </ac:grpSpMkLst>
-        </pc:grpChg>
-        <pc:grpChg chg="del">
-          <ac:chgData name="Amouzou, Komi Mekaeli" userId="020e202c-3c4c-4e52-9bfa-205f5f67fc05" providerId="ADAL" clId="{DFF75377-3DF0-4A60-90BA-EBCBE8F9083E}" dt="2026-01-29T02:33:45.747" v="2327" actId="478"/>
-          <ac:grpSpMkLst>
-            <pc:docMk/>
-            <pc:sldMk cId="3433642152" sldId="257"/>
-            <ac:grpSpMk id="40" creationId="{28EA3F07-9C93-4700-6AC3-D19D8C0D3D00}"/>
-          </ac:grpSpMkLst>
-        </pc:grpChg>
-        <pc:grpChg chg="del">
-          <ac:chgData name="Amouzou, Komi Mekaeli" userId="020e202c-3c4c-4e52-9bfa-205f5f67fc05" providerId="ADAL" clId="{DFF75377-3DF0-4A60-90BA-EBCBE8F9083E}" dt="2026-01-29T02:33:45.747" v="2327" actId="478"/>
-          <ac:grpSpMkLst>
-            <pc:docMk/>
-            <pc:sldMk cId="3433642152" sldId="257"/>
-            <ac:grpSpMk id="43" creationId="{BF4E6F5D-EEC9-3652-3351-4F1725316D71}"/>
-          </ac:grpSpMkLst>
-        </pc:grpChg>
-        <pc:grpChg chg="add mod">
-          <ac:chgData name="Amouzou, Komi Mekaeli" userId="020e202c-3c4c-4e52-9bfa-205f5f67fc05" providerId="ADAL" clId="{DFF75377-3DF0-4A60-90BA-EBCBE8F9083E}" dt="2026-01-29T03:45:16.189" v="3667" actId="1038"/>
-          <ac:grpSpMkLst>
-            <pc:docMk/>
-            <pc:sldMk cId="3433642152" sldId="257"/>
-            <ac:grpSpMk id="54" creationId="{5439B304-D9AB-2AB3-0B9E-126762BE1F3D}"/>
-          </ac:grpSpMkLst>
-        </pc:grpChg>
-        <pc:grpChg chg="add mod">
-          <ac:chgData name="Amouzou, Komi Mekaeli" userId="020e202c-3c4c-4e52-9bfa-205f5f67fc05" providerId="ADAL" clId="{DFF75377-3DF0-4A60-90BA-EBCBE8F9083E}" dt="2026-01-29T02:59:52.101" v="2885" actId="1076"/>
-          <ac:grpSpMkLst>
-            <pc:docMk/>
-            <pc:sldMk cId="3433642152" sldId="257"/>
-            <ac:grpSpMk id="59" creationId="{1008E394-1D4D-EC15-32E5-FD2870F3CB81}"/>
-          </ac:grpSpMkLst>
-        </pc:grpChg>
-        <pc:grpChg chg="add mod">
-          <ac:chgData name="Amouzou, Komi Mekaeli" userId="020e202c-3c4c-4e52-9bfa-205f5f67fc05" providerId="ADAL" clId="{DFF75377-3DF0-4A60-90BA-EBCBE8F9083E}" dt="2026-01-29T03:03:21.148" v="3009"/>
-          <ac:grpSpMkLst>
-            <pc:docMk/>
-            <pc:sldMk cId="3433642152" sldId="257"/>
-            <ac:grpSpMk id="66" creationId="{2706C479-2E55-1F9F-C4DA-68DA2C94BA95}"/>
-          </ac:grpSpMkLst>
-        </pc:grpChg>
-        <pc:grpChg chg="add del mod">
-          <ac:chgData name="Amouzou, Komi Mekaeli" userId="020e202c-3c4c-4e52-9bfa-205f5f67fc05" providerId="ADAL" clId="{DFF75377-3DF0-4A60-90BA-EBCBE8F9083E}" dt="2026-01-29T03:47:45.136" v="3716" actId="165"/>
-          <ac:grpSpMkLst>
-            <pc:docMk/>
-            <pc:sldMk cId="3433642152" sldId="257"/>
-            <ac:grpSpMk id="76" creationId="{727D5B74-EF65-C4A1-AF01-CF6A5AADB1C0}"/>
-          </ac:grpSpMkLst>
-        </pc:grpChg>
-        <pc:grpChg chg="add mod">
-          <ac:chgData name="Amouzou, Komi Mekaeli" userId="020e202c-3c4c-4e52-9bfa-205f5f67fc05" providerId="ADAL" clId="{DFF75377-3DF0-4A60-90BA-EBCBE8F9083E}" dt="2026-01-29T03:48:28.733" v="3723" actId="164"/>
-          <ac:grpSpMkLst>
-            <pc:docMk/>
-            <pc:sldMk cId="3433642152" sldId="257"/>
-            <ac:grpSpMk id="87" creationId="{370CBF40-6C2B-15E9-4341-5271378F6334}"/>
-          </ac:grpSpMkLst>
-        </pc:grpChg>
-        <pc:cxnChg chg="add mod">
-          <ac:chgData name="Amouzou, Komi Mekaeli" userId="020e202c-3c4c-4e52-9bfa-205f5f67fc05" providerId="ADAL" clId="{DFF75377-3DF0-4A60-90BA-EBCBE8F9083E}" dt="2026-01-29T02:47:09.046" v="2585" actId="1076"/>
-          <ac:cxnSpMkLst>
-            <pc:docMk/>
-            <pc:sldMk cId="3433642152" sldId="257"/>
-            <ac:cxnSpMk id="8" creationId="{E4C35BC8-C5B0-DFF6-E41D-B40B2E2E86DC}"/>
-          </ac:cxnSpMkLst>
-        </pc:cxnChg>
-        <pc:cxnChg chg="add mod">
-          <ac:chgData name="Amouzou, Komi Mekaeli" userId="020e202c-3c4c-4e52-9bfa-205f5f67fc05" providerId="ADAL" clId="{DFF75377-3DF0-4A60-90BA-EBCBE8F9083E}" dt="2026-01-29T02:49:43.155" v="2658" actId="1076"/>
-          <ac:cxnSpMkLst>
-            <pc:docMk/>
-            <pc:sldMk cId="3433642152" sldId="257"/>
-            <ac:cxnSpMk id="18" creationId="{7D4F381C-A11C-C0D0-A893-4BB9C98E7043}"/>
-          </ac:cxnSpMkLst>
-        </pc:cxnChg>
-        <pc:cxnChg chg="add mod">
-          <ac:chgData name="Amouzou, Komi Mekaeli" userId="020e202c-3c4c-4e52-9bfa-205f5f67fc05" providerId="ADAL" clId="{DFF75377-3DF0-4A60-90BA-EBCBE8F9083E}" dt="2026-01-29T02:53:58.059" v="2752" actId="571"/>
-          <ac:cxnSpMkLst>
-            <pc:docMk/>
-            <pc:sldMk cId="3433642152" sldId="257"/>
-            <ac:cxnSpMk id="26" creationId="{E25C5020-0B65-0972-E3DC-359418CB3BAA}"/>
-          </ac:cxnSpMkLst>
-        </pc:cxnChg>
-        <pc:cxnChg chg="add del mod">
-          <ac:chgData name="Amouzou, Komi Mekaeli" userId="020e202c-3c4c-4e52-9bfa-205f5f67fc05" providerId="ADAL" clId="{DFF75377-3DF0-4A60-90BA-EBCBE8F9083E}" dt="2026-01-29T02:55:23.444" v="2794" actId="478"/>
-          <ac:cxnSpMkLst>
-            <pc:docMk/>
-            <pc:sldMk cId="3433642152" sldId="257"/>
-            <ac:cxnSpMk id="46" creationId="{D11A07EF-40D4-665A-2693-705E52E48A28}"/>
-          </ac:cxnSpMkLst>
-        </pc:cxnChg>
-        <pc:cxnChg chg="add mod">
-          <ac:chgData name="Amouzou, Komi Mekaeli" userId="020e202c-3c4c-4e52-9bfa-205f5f67fc05" providerId="ADAL" clId="{DFF75377-3DF0-4A60-90BA-EBCBE8F9083E}" dt="2026-01-29T03:46:33.681" v="3701" actId="1036"/>
-          <ac:cxnSpMkLst>
-            <pc:docMk/>
-            <pc:sldMk cId="3433642152" sldId="257"/>
-            <ac:cxnSpMk id="51" creationId="{0FD62494-6EA8-0D5F-8E00-5505D45F6C2A}"/>
-          </ac:cxnSpMkLst>
-        </pc:cxnChg>
-        <pc:cxnChg chg="add mod">
-          <ac:chgData name="Amouzou, Komi Mekaeli" userId="020e202c-3c4c-4e52-9bfa-205f5f67fc05" providerId="ADAL" clId="{DFF75377-3DF0-4A60-90BA-EBCBE8F9083E}" dt="2026-01-29T03:45:16.189" v="3667" actId="1038"/>
-          <ac:cxnSpMkLst>
-            <pc:docMk/>
-            <pc:sldMk cId="3433642152" sldId="257"/>
-            <ac:cxnSpMk id="58" creationId="{5608EC55-10FA-C8AE-807D-E71AA2F3DEE7}"/>
-          </ac:cxnSpMkLst>
-        </pc:cxnChg>
-        <pc:cxnChg chg="add mod">
-          <ac:chgData name="Amouzou, Komi Mekaeli" userId="020e202c-3c4c-4e52-9bfa-205f5f67fc05" providerId="ADAL" clId="{DFF75377-3DF0-4A60-90BA-EBCBE8F9083E}" dt="2026-01-29T02:59:59.511" v="2886"/>
-          <ac:cxnSpMkLst>
-            <pc:docMk/>
-            <pc:sldMk cId="3433642152" sldId="257"/>
-            <ac:cxnSpMk id="63" creationId="{01921BF1-686D-309B-7F2C-574A5EA119CD}"/>
-          </ac:cxnSpMkLst>
-        </pc:cxnChg>
-        <pc:cxnChg chg="add mod">
-          <ac:chgData name="Amouzou, Komi Mekaeli" userId="020e202c-3c4c-4e52-9bfa-205f5f67fc05" providerId="ADAL" clId="{DFF75377-3DF0-4A60-90BA-EBCBE8F9083E}" dt="2026-01-29T03:00:12.699" v="2889" actId="1076"/>
-          <ac:cxnSpMkLst>
-            <pc:docMk/>
-            <pc:sldMk cId="3433642152" sldId="257"/>
-            <ac:cxnSpMk id="64" creationId="{B4BEAF49-2A48-AF9F-FD88-F5FDEF76F197}"/>
-          </ac:cxnSpMkLst>
-        </pc:cxnChg>
-        <pc:cxnChg chg="add mod">
-          <ac:chgData name="Amouzou, Komi Mekaeli" userId="020e202c-3c4c-4e52-9bfa-205f5f67fc05" providerId="ADAL" clId="{DFF75377-3DF0-4A60-90BA-EBCBE8F9083E}" dt="2026-01-29T03:05:48.873" v="3083" actId="1076"/>
-          <ac:cxnSpMkLst>
-            <pc:docMk/>
-            <pc:sldMk cId="3433642152" sldId="257"/>
-            <ac:cxnSpMk id="71" creationId="{7173B259-A4D1-E448-6C5D-452C10623F8A}"/>
-          </ac:cxnSpMkLst>
-        </pc:cxnChg>
-        <pc:cxnChg chg="add mod">
-          <ac:chgData name="Amouzou, Komi Mekaeli" userId="020e202c-3c4c-4e52-9bfa-205f5f67fc05" providerId="ADAL" clId="{DFF75377-3DF0-4A60-90BA-EBCBE8F9083E}" dt="2026-01-29T03:07:07.161" v="3090" actId="1076"/>
-          <ac:cxnSpMkLst>
-            <pc:docMk/>
-            <pc:sldMk cId="3433642152" sldId="257"/>
-            <ac:cxnSpMk id="80" creationId="{3C00F96D-C750-D393-4826-E9D2138BA0B6}"/>
-          </ac:cxnSpMkLst>
-        </pc:cxnChg>
       </pc:sldChg>
       <pc:sldChg chg="addSp delSp modSp new mod">
         <pc:chgData name="Amouzou, Komi Mekaeli" userId="020e202c-3c4c-4e52-9bfa-205f5f67fc05" providerId="ADAL" clId="{DFF75377-3DF0-4A60-90BA-EBCBE8F9083E}" dt="2026-01-29T03:30:38.241" v="3569" actId="14100"/>
@@ -1176,22 +728,6 @@
           <pc:docMk/>
           <pc:sldMk cId="1964933747" sldId="258"/>
         </pc:sldMkLst>
-        <pc:spChg chg="del">
-          <ac:chgData name="Amouzou, Komi Mekaeli" userId="020e202c-3c4c-4e52-9bfa-205f5f67fc05" providerId="ADAL" clId="{DFF75377-3DF0-4A60-90BA-EBCBE8F9083E}" dt="2026-01-29T03:28:38.777" v="3518" actId="478"/>
-          <ac:spMkLst>
-            <pc:docMk/>
-            <pc:sldMk cId="1964933747" sldId="258"/>
-            <ac:spMk id="2" creationId="{B2D80B76-9CF6-DA98-AAFE-C0EEAFC9FD07}"/>
-          </ac:spMkLst>
-        </pc:spChg>
-        <pc:spChg chg="del">
-          <ac:chgData name="Amouzou, Komi Mekaeli" userId="020e202c-3c4c-4e52-9bfa-205f5f67fc05" providerId="ADAL" clId="{DFF75377-3DF0-4A60-90BA-EBCBE8F9083E}" dt="2026-01-29T03:28:37.886" v="3517" actId="478"/>
-          <ac:spMkLst>
-            <pc:docMk/>
-            <pc:sldMk cId="1964933747" sldId="258"/>
-            <ac:spMk id="3" creationId="{90DA9455-B242-02C7-DAB8-589AA329172A}"/>
-          </ac:spMkLst>
-        </pc:spChg>
         <pc:graphicFrameChg chg="add mod modGraphic">
           <ac:chgData name="Amouzou, Komi Mekaeli" userId="020e202c-3c4c-4e52-9bfa-205f5f67fc05" providerId="ADAL" clId="{DFF75377-3DF0-4A60-90BA-EBCBE8F9083E}" dt="2026-01-29T03:30:38.241" v="3569" actId="14100"/>
           <ac:graphicFrameMkLst>
@@ -1207,22 +743,6 @@
           <pc:docMk/>
           <pc:sldMk cId="3667961849" sldId="259"/>
         </pc:sldMkLst>
-        <pc:spChg chg="del">
-          <ac:chgData name="Amouzou, Komi Mekaeli" userId="020e202c-3c4c-4e52-9bfa-205f5f67fc05" providerId="ADAL" clId="{DFF75377-3DF0-4A60-90BA-EBCBE8F9083E}" dt="2026-01-29T03:32:32.537" v="3572" actId="478"/>
-          <ac:spMkLst>
-            <pc:docMk/>
-            <pc:sldMk cId="3667961849" sldId="259"/>
-            <ac:spMk id="2" creationId="{A4889865-C707-D0AC-D328-1A5A2D747ECD}"/>
-          </ac:spMkLst>
-        </pc:spChg>
-        <pc:spChg chg="del">
-          <ac:chgData name="Amouzou, Komi Mekaeli" userId="020e202c-3c4c-4e52-9bfa-205f5f67fc05" providerId="ADAL" clId="{DFF75377-3DF0-4A60-90BA-EBCBE8F9083E}" dt="2026-01-29T03:32:30.914" v="3571" actId="478"/>
-          <ac:spMkLst>
-            <pc:docMk/>
-            <pc:sldMk cId="3667961849" sldId="259"/>
-            <ac:spMk id="3" creationId="{2D9BF75B-4622-D5EC-7505-DC4BC530C423}"/>
-          </ac:spMkLst>
-        </pc:spChg>
         <pc:spChg chg="mod">
           <ac:chgData name="Amouzou, Komi Mekaeli" userId="020e202c-3c4c-4e52-9bfa-205f5f67fc05" providerId="ADAL" clId="{DFF75377-3DF0-4A60-90BA-EBCBE8F9083E}" dt="2026-01-29T03:32:45.908" v="3573"/>
           <ac:spMkLst>
@@ -1255,30 +775,6 @@
             <ac:spMk id="8" creationId="{22CB4ADC-D86F-E1AC-D28C-232905C3526F}"/>
           </ac:spMkLst>
         </pc:spChg>
-        <pc:spChg chg="mod">
-          <ac:chgData name="Amouzou, Komi Mekaeli" userId="020e202c-3c4c-4e52-9bfa-205f5f67fc05" providerId="ADAL" clId="{DFF75377-3DF0-4A60-90BA-EBCBE8F9083E}" dt="2026-01-29T03:32:58.221" v="3576"/>
-          <ac:spMkLst>
-            <pc:docMk/>
-            <pc:sldMk cId="3667961849" sldId="259"/>
-            <ac:spMk id="10" creationId="{AD06B1E6-8A08-656E-C153-B7F1B294EF1C}"/>
-          </ac:spMkLst>
-        </pc:spChg>
-        <pc:spChg chg="mod">
-          <ac:chgData name="Amouzou, Komi Mekaeli" userId="020e202c-3c4c-4e52-9bfa-205f5f67fc05" providerId="ADAL" clId="{DFF75377-3DF0-4A60-90BA-EBCBE8F9083E}" dt="2026-01-29T03:32:58.221" v="3576"/>
-          <ac:spMkLst>
-            <pc:docMk/>
-            <pc:sldMk cId="3667961849" sldId="259"/>
-            <ac:spMk id="11" creationId="{B06063C7-DD4B-6AAD-7B9A-28DB3BBFCAF0}"/>
-          </ac:spMkLst>
-        </pc:spChg>
-        <pc:spChg chg="mod">
-          <ac:chgData name="Amouzou, Komi Mekaeli" userId="020e202c-3c4c-4e52-9bfa-205f5f67fc05" providerId="ADAL" clId="{DFF75377-3DF0-4A60-90BA-EBCBE8F9083E}" dt="2026-01-29T03:32:58.221" v="3576"/>
-          <ac:spMkLst>
-            <pc:docMk/>
-            <pc:sldMk cId="3667961849" sldId="259"/>
-            <ac:spMk id="12" creationId="{3514ED26-645D-DC44-87E7-C3F2D87E9F56}"/>
-          </ac:spMkLst>
-        </pc:spChg>
         <pc:spChg chg="add mod">
           <ac:chgData name="Amouzou, Komi Mekaeli" userId="020e202c-3c4c-4e52-9bfa-205f5f67fc05" providerId="ADAL" clId="{DFF75377-3DF0-4A60-90BA-EBCBE8F9083E}" dt="2026-01-29T03:36:03.118" v="3637" actId="115"/>
           <ac:spMkLst>
@@ -1295,17 +791,9 @@
             <ac:grpSpMk id="4" creationId="{0AF198B3-1FB5-CFC5-68DD-69265BFEB010}"/>
           </ac:grpSpMkLst>
         </pc:grpChg>
-        <pc:grpChg chg="add mod">
-          <ac:chgData name="Amouzou, Komi Mekaeli" userId="020e202c-3c4c-4e52-9bfa-205f5f67fc05" providerId="ADAL" clId="{DFF75377-3DF0-4A60-90BA-EBCBE8F9083E}" dt="2026-01-29T03:32:58.221" v="3576"/>
-          <ac:grpSpMkLst>
-            <pc:docMk/>
-            <pc:sldMk cId="3667961849" sldId="259"/>
-            <ac:grpSpMk id="9" creationId="{2F9D1E8E-FCCF-355D-3ADC-53A0EC16B164}"/>
-          </ac:grpSpMkLst>
-        </pc:grpChg>
       </pc:sldChg>
       <pc:sldChg chg="addSp delSp modSp add mod ord">
-        <pc:chgData name="Amouzou, Komi Mekaeli" userId="020e202c-3c4c-4e52-9bfa-205f5f67fc05" providerId="ADAL" clId="{DFF75377-3DF0-4A60-90BA-EBCBE8F9083E}" dt="2026-01-30T15:39:58.367" v="5369" actId="20577"/>
+        <pc:chgData name="Amouzou, Komi Mekaeli" userId="020e202c-3c4c-4e52-9bfa-205f5f67fc05" providerId="ADAL" clId="{DFF75377-3DF0-4A60-90BA-EBCBE8F9083E}" dt="2026-01-31T20:09:01.118" v="5527" actId="313"/>
         <pc:sldMkLst>
           <pc:docMk/>
           <pc:sldMk cId="2063007720" sldId="260"/>
@@ -1326,16 +814,8 @@
             <ac:spMk id="3" creationId="{00EBD1E8-64B8-CB8E-61C3-F5570D55592A}"/>
           </ac:spMkLst>
         </pc:spChg>
-        <pc:spChg chg="del mod">
-          <ac:chgData name="Amouzou, Komi Mekaeli" userId="020e202c-3c4c-4e52-9bfa-205f5f67fc05" providerId="ADAL" clId="{DFF75377-3DF0-4A60-90BA-EBCBE8F9083E}" dt="2026-01-29T07:40:18.125" v="4083" actId="478"/>
-          <ac:spMkLst>
-            <pc:docMk/>
-            <pc:sldMk cId="2063007720" sldId="260"/>
-            <ac:spMk id="4" creationId="{CF0EBE6C-B869-0316-55E3-8FC3A3450D75}"/>
-          </ac:spMkLst>
-        </pc:spChg>
         <pc:spChg chg="mod">
-          <ac:chgData name="Amouzou, Komi Mekaeli" userId="020e202c-3c4c-4e52-9bfa-205f5f67fc05" providerId="ADAL" clId="{DFF75377-3DF0-4A60-90BA-EBCBE8F9083E}" dt="2026-01-30T11:24:46.024" v="5330" actId="1076"/>
+          <ac:chgData name="Amouzou, Komi Mekaeli" userId="020e202c-3c4c-4e52-9bfa-205f5f67fc05" providerId="ADAL" clId="{DFF75377-3DF0-4A60-90BA-EBCBE8F9083E}" dt="2026-01-31T11:28:40.594" v="5423" actId="1035"/>
           <ac:spMkLst>
             <pc:docMk/>
             <pc:sldMk cId="2063007720" sldId="260"/>
@@ -1350,14 +830,6 @@
             <ac:spMk id="7" creationId="{5E3A8A50-FC99-322A-031E-5B0BCE983AAA}"/>
           </ac:spMkLst>
         </pc:spChg>
-        <pc:spChg chg="mod">
-          <ac:chgData name="Amouzou, Komi Mekaeli" userId="020e202c-3c4c-4e52-9bfa-205f5f67fc05" providerId="ADAL" clId="{DFF75377-3DF0-4A60-90BA-EBCBE8F9083E}" dt="2026-01-29T11:25:04.894" v="4382" actId="20577"/>
-          <ac:spMkLst>
-            <pc:docMk/>
-            <pc:sldMk cId="2063007720" sldId="260"/>
-            <ac:spMk id="8" creationId="{9483A379-8C66-BB48-E049-BD79411348CF}"/>
-          </ac:spMkLst>
-        </pc:spChg>
         <pc:spChg chg="mod topLvl">
           <ac:chgData name="Amouzou, Komi Mekaeli" userId="020e202c-3c4c-4e52-9bfa-205f5f67fc05" providerId="ADAL" clId="{DFF75377-3DF0-4A60-90BA-EBCBE8F9083E}" dt="2026-01-30T11:24:46.024" v="5330" actId="1076"/>
           <ac:spMkLst>
@@ -1415,43 +887,27 @@
           </ac:spMkLst>
         </pc:spChg>
         <pc:spChg chg="mod">
-          <ac:chgData name="Amouzou, Komi Mekaeli" userId="020e202c-3c4c-4e52-9bfa-205f5f67fc05" providerId="ADAL" clId="{DFF75377-3DF0-4A60-90BA-EBCBE8F9083E}" dt="2026-01-29T11:24:29.213" v="4345" actId="571"/>
+          <ac:chgData name="Amouzou, Komi Mekaeli" userId="020e202c-3c4c-4e52-9bfa-205f5f67fc05" providerId="ADAL" clId="{DFF75377-3DF0-4A60-90BA-EBCBE8F9083E}" dt="2026-01-31T11:23:53.006" v="5372" actId="571"/>
           <ac:spMkLst>
             <pc:docMk/>
             <pc:sldMk cId="2063007720" sldId="260"/>
-            <ac:spMk id="17" creationId="{84771A62-2EF2-C4C4-EFC2-882FB2476F44}"/>
+            <ac:spMk id="17" creationId="{150F4D11-D8A9-EC18-B15A-8FED0D26C888}"/>
           </ac:spMkLst>
         </pc:spChg>
         <pc:spChg chg="mod">
-          <ac:chgData name="Amouzou, Komi Mekaeli" userId="020e202c-3c4c-4e52-9bfa-205f5f67fc05" providerId="ADAL" clId="{DFF75377-3DF0-4A60-90BA-EBCBE8F9083E}" dt="2026-01-29T11:24:47.536" v="4360" actId="14100"/>
+          <ac:chgData name="Amouzou, Komi Mekaeli" userId="020e202c-3c4c-4e52-9bfa-205f5f67fc05" providerId="ADAL" clId="{DFF75377-3DF0-4A60-90BA-EBCBE8F9083E}" dt="2026-01-31T11:23:53.006" v="5372" actId="571"/>
           <ac:spMkLst>
             <pc:docMk/>
             <pc:sldMk cId="2063007720" sldId="260"/>
-            <ac:spMk id="18" creationId="{A23282DB-716D-2B04-BE27-0D630CE47981}"/>
+            <ac:spMk id="19" creationId="{BA34A215-8A9B-4868-5B0F-56AAB364CA00}"/>
           </ac:spMkLst>
         </pc:spChg>
-        <pc:spChg chg="add del mod">
-          <ac:chgData name="Amouzou, Komi Mekaeli" userId="020e202c-3c4c-4e52-9bfa-205f5f67fc05" providerId="ADAL" clId="{DFF75377-3DF0-4A60-90BA-EBCBE8F9083E}" dt="2026-01-29T07:30:52.894" v="4001" actId="478"/>
+        <pc:spChg chg="mod">
+          <ac:chgData name="Amouzou, Komi Mekaeli" userId="020e202c-3c4c-4e52-9bfa-205f5f67fc05" providerId="ADAL" clId="{DFF75377-3DF0-4A60-90BA-EBCBE8F9083E}" dt="2026-01-31T11:23:53.006" v="5372" actId="571"/>
           <ac:spMkLst>
             <pc:docMk/>
             <pc:sldMk cId="2063007720" sldId="260"/>
-            <ac:spMk id="20" creationId="{BF04E707-7DD4-CEF9-49ED-D04A95A717B8}"/>
-          </ac:spMkLst>
-        </pc:spChg>
-        <pc:spChg chg="del mod">
-          <ac:chgData name="Amouzou, Komi Mekaeli" userId="020e202c-3c4c-4e52-9bfa-205f5f67fc05" providerId="ADAL" clId="{DFF75377-3DF0-4A60-90BA-EBCBE8F9083E}" dt="2026-01-29T07:24:12.827" v="3932" actId="478"/>
-          <ac:spMkLst>
-            <pc:docMk/>
-            <pc:sldMk cId="2063007720" sldId="260"/>
-            <ac:spMk id="21" creationId="{B1754F39-95D9-14CC-7573-BDDE8996FC42}"/>
-          </ac:spMkLst>
-        </pc:spChg>
-        <pc:spChg chg="del mod">
-          <ac:chgData name="Amouzou, Komi Mekaeli" userId="020e202c-3c4c-4e52-9bfa-205f5f67fc05" providerId="ADAL" clId="{DFF75377-3DF0-4A60-90BA-EBCBE8F9083E}" dt="2026-01-29T07:53:17.248" v="4258" actId="478"/>
-          <ac:spMkLst>
-            <pc:docMk/>
-            <pc:sldMk cId="2063007720" sldId="260"/>
-            <ac:spMk id="27" creationId="{DFDB22C2-AC7D-91D4-E080-E0BA3D0B5DD4}"/>
+            <ac:spMk id="20" creationId="{21E86066-DAEE-7F1C-04B5-F96E3F56DABF}"/>
           </ac:spMkLst>
         </pc:spChg>
         <pc:spChg chg="mod">
@@ -1478,32 +934,8 @@
             <ac:spMk id="35" creationId="{E8AB8A65-6FEB-2C02-AF60-C11814AAC1E6}"/>
           </ac:spMkLst>
         </pc:spChg>
-        <pc:spChg chg="mod">
-          <ac:chgData name="Amouzou, Komi Mekaeli" userId="020e202c-3c4c-4e52-9bfa-205f5f67fc05" providerId="ADAL" clId="{DFF75377-3DF0-4A60-90BA-EBCBE8F9083E}" dt="2026-01-29T07:36:17.265" v="4033" actId="571"/>
-          <ac:spMkLst>
-            <pc:docMk/>
-            <pc:sldMk cId="2063007720" sldId="260"/>
-            <ac:spMk id="38" creationId="{22A16035-71B5-AE0F-8621-9C733C3A8AB0}"/>
-          </ac:spMkLst>
-        </pc:spChg>
-        <pc:spChg chg="mod">
-          <ac:chgData name="Amouzou, Komi Mekaeli" userId="020e202c-3c4c-4e52-9bfa-205f5f67fc05" providerId="ADAL" clId="{DFF75377-3DF0-4A60-90BA-EBCBE8F9083E}" dt="2026-01-29T07:36:17.265" v="4033" actId="571"/>
-          <ac:spMkLst>
-            <pc:docMk/>
-            <pc:sldMk cId="2063007720" sldId="260"/>
-            <ac:spMk id="39" creationId="{B89A0F82-3BBC-1458-1758-A5470F32CD64}"/>
-          </ac:spMkLst>
-        </pc:spChg>
-        <pc:spChg chg="mod">
-          <ac:chgData name="Amouzou, Komi Mekaeli" userId="020e202c-3c4c-4e52-9bfa-205f5f67fc05" providerId="ADAL" clId="{DFF75377-3DF0-4A60-90BA-EBCBE8F9083E}" dt="2026-01-29T07:36:17.265" v="4033" actId="571"/>
-          <ac:spMkLst>
-            <pc:docMk/>
-            <pc:sldMk cId="2063007720" sldId="260"/>
-            <ac:spMk id="40" creationId="{B4878FE6-FA8F-15D5-F9B4-FAEF921B7A28}"/>
-          </ac:spMkLst>
-        </pc:spChg>
         <pc:spChg chg="mod topLvl">
-          <ac:chgData name="Amouzou, Komi Mekaeli" userId="020e202c-3c4c-4e52-9bfa-205f5f67fc05" providerId="ADAL" clId="{DFF75377-3DF0-4A60-90BA-EBCBE8F9083E}" dt="2026-01-30T11:11:32.762" v="5089" actId="165"/>
+          <ac:chgData name="Amouzou, Komi Mekaeli" userId="020e202c-3c4c-4e52-9bfa-205f5f67fc05" providerId="ADAL" clId="{DFF75377-3DF0-4A60-90BA-EBCBE8F9083E}" dt="2026-01-31T20:03:10.728" v="5523" actId="338"/>
           <ac:spMkLst>
             <pc:docMk/>
             <pc:sldMk cId="2063007720" sldId="260"/>
@@ -1511,7 +943,7 @@
           </ac:spMkLst>
         </pc:spChg>
         <pc:spChg chg="mod topLvl">
-          <ac:chgData name="Amouzou, Komi Mekaeli" userId="020e202c-3c4c-4e52-9bfa-205f5f67fc05" providerId="ADAL" clId="{DFF75377-3DF0-4A60-90BA-EBCBE8F9083E}" dt="2026-01-30T09:43:38.033" v="5000" actId="122"/>
+          <ac:chgData name="Amouzou, Komi Mekaeli" userId="020e202c-3c4c-4e52-9bfa-205f5f67fc05" providerId="ADAL" clId="{DFF75377-3DF0-4A60-90BA-EBCBE8F9083E}" dt="2026-01-31T20:03:38.973" v="5524" actId="338"/>
           <ac:spMkLst>
             <pc:docMk/>
             <pc:sldMk cId="2063007720" sldId="260"/>
@@ -1519,7 +951,7 @@
           </ac:spMkLst>
         </pc:spChg>
         <pc:spChg chg="mod topLvl">
-          <ac:chgData name="Amouzou, Komi Mekaeli" userId="020e202c-3c4c-4e52-9bfa-205f5f67fc05" providerId="ADAL" clId="{DFF75377-3DF0-4A60-90BA-EBCBE8F9083E}" dt="2026-01-30T11:05:38.143" v="5083" actId="13926"/>
+          <ac:chgData name="Amouzou, Komi Mekaeli" userId="020e202c-3c4c-4e52-9bfa-205f5f67fc05" providerId="ADAL" clId="{DFF75377-3DF0-4A60-90BA-EBCBE8F9083E}" dt="2026-01-31T20:03:10.728" v="5523" actId="338"/>
           <ac:spMkLst>
             <pc:docMk/>
             <pc:sldMk cId="2063007720" sldId="260"/>
@@ -1606,16 +1038,8 @@
             <ac:spMk id="83" creationId="{5145A132-6590-7866-2A0E-5801F306D6A1}"/>
           </ac:spMkLst>
         </pc:spChg>
-        <pc:spChg chg="del">
-          <ac:chgData name="Amouzou, Komi Mekaeli" userId="020e202c-3c4c-4e52-9bfa-205f5f67fc05" providerId="ADAL" clId="{DFF75377-3DF0-4A60-90BA-EBCBE8F9083E}" dt="2026-01-29T07:53:00.157" v="4253" actId="478"/>
-          <ac:spMkLst>
-            <pc:docMk/>
-            <pc:sldMk cId="2063007720" sldId="260"/>
-            <ac:spMk id="85" creationId="{948D9C4E-0FE0-3F09-0F41-FABA411970F4}"/>
-          </ac:spMkLst>
-        </pc:spChg>
         <pc:spChg chg="mod">
-          <ac:chgData name="Amouzou, Komi Mekaeli" userId="020e202c-3c4c-4e52-9bfa-205f5f67fc05" providerId="ADAL" clId="{DFF75377-3DF0-4A60-90BA-EBCBE8F9083E}" dt="2026-01-30T15:39:58.367" v="5369" actId="20577"/>
+          <ac:chgData name="Amouzou, Komi Mekaeli" userId="020e202c-3c4c-4e52-9bfa-205f5f67fc05" providerId="ADAL" clId="{DFF75377-3DF0-4A60-90BA-EBCBE8F9083E}" dt="2026-01-31T20:09:01.118" v="5527" actId="313"/>
           <ac:spMkLst>
             <pc:docMk/>
             <pc:sldMk cId="2063007720" sldId="260"/>
@@ -1647,11 +1071,35 @@
           </ac:grpSpMkLst>
         </pc:grpChg>
         <pc:grpChg chg="add del mod">
-          <ac:chgData name="Amouzou, Komi Mekaeli" userId="020e202c-3c4c-4e52-9bfa-205f5f67fc05" providerId="ADAL" clId="{DFF75377-3DF0-4A60-90BA-EBCBE8F9083E}" dt="2026-01-30T11:21:14.130" v="5322" actId="1036"/>
+          <ac:chgData name="Amouzou, Komi Mekaeli" userId="020e202c-3c4c-4e52-9bfa-205f5f67fc05" providerId="ADAL" clId="{DFF75377-3DF0-4A60-90BA-EBCBE8F9083E}" dt="2026-01-31T11:26:07.536" v="5398" actId="165"/>
           <ac:grpSpMkLst>
             <pc:docMk/>
             <pc:sldMk cId="2063007720" sldId="260"/>
             <ac:grpSpMk id="8" creationId="{1966FFE8-0F64-2C5C-CB24-86BE3421DEBB}"/>
+          </ac:grpSpMkLst>
+        </pc:grpChg>
+        <pc:grpChg chg="add mod">
+          <ac:chgData name="Amouzou, Komi Mekaeli" userId="020e202c-3c4c-4e52-9bfa-205f5f67fc05" providerId="ADAL" clId="{DFF75377-3DF0-4A60-90BA-EBCBE8F9083E}" dt="2026-01-31T20:03:10.728" v="5523" actId="338"/>
+          <ac:grpSpMkLst>
+            <pc:docMk/>
+            <pc:sldMk cId="2063007720" sldId="260"/>
+            <ac:grpSpMk id="8" creationId="{BF40DA47-AD8E-87CC-F541-9DCFBA7895EE}"/>
+          </ac:grpSpMkLst>
+        </pc:grpChg>
+        <pc:grpChg chg="add mod">
+          <ac:chgData name="Amouzou, Komi Mekaeli" userId="020e202c-3c4c-4e52-9bfa-205f5f67fc05" providerId="ADAL" clId="{DFF75377-3DF0-4A60-90BA-EBCBE8F9083E}" dt="2026-01-31T20:03:42.544" v="5526" actId="1076"/>
+          <ac:grpSpMkLst>
+            <pc:docMk/>
+            <pc:sldMk cId="2063007720" sldId="260"/>
+            <ac:grpSpMk id="15" creationId="{5760850F-E3BE-E5DD-C476-023AA830CC88}"/>
+          </ac:grpSpMkLst>
+        </pc:grpChg>
+        <pc:grpChg chg="add mod">
+          <ac:chgData name="Amouzou, Komi Mekaeli" userId="020e202c-3c4c-4e52-9bfa-205f5f67fc05" providerId="ADAL" clId="{DFF75377-3DF0-4A60-90BA-EBCBE8F9083E}" dt="2026-01-31T11:23:53.006" v="5372" actId="571"/>
+          <ac:grpSpMkLst>
+            <pc:docMk/>
+            <pc:sldMk cId="2063007720" sldId="260"/>
+            <ac:grpSpMk id="15" creationId="{5E1DA03F-8FCA-FA1F-3F1B-F4CDA4F5B0C2}"/>
           </ac:grpSpMkLst>
         </pc:grpChg>
         <pc:grpChg chg="del mod">
@@ -1694,12 +1142,28 @@
             <ac:grpSpMk id="20" creationId="{C0B341A4-C650-88D6-43C3-205D1C6110E5}"/>
           </ac:grpSpMkLst>
         </pc:grpChg>
-        <pc:grpChg chg="del mod">
-          <ac:chgData name="Amouzou, Komi Mekaeli" userId="020e202c-3c4c-4e52-9bfa-205f5f67fc05" providerId="ADAL" clId="{DFF75377-3DF0-4A60-90BA-EBCBE8F9083E}" dt="2026-01-29T07:30:49.512" v="3999" actId="478"/>
+        <pc:grpChg chg="add del mod">
+          <ac:chgData name="Amouzou, Komi Mekaeli" userId="020e202c-3c4c-4e52-9bfa-205f5f67fc05" providerId="ADAL" clId="{DFF75377-3DF0-4A60-90BA-EBCBE8F9083E}" dt="2026-01-31T11:27:46.063" v="5405" actId="165"/>
           <ac:grpSpMkLst>
             <pc:docMk/>
             <pc:sldMk cId="2063007720" sldId="260"/>
-            <ac:grpSpMk id="22" creationId="{BA92F0AB-BBDC-25FE-7BDC-DB642D07F3FE}"/>
+            <ac:grpSpMk id="24" creationId="{555936C7-CD7B-4D80-EC85-4790DCD0C5B3}"/>
+          </ac:grpSpMkLst>
+        </pc:grpChg>
+        <pc:grpChg chg="add mod topLvl">
+          <ac:chgData name="Amouzou, Komi Mekaeli" userId="020e202c-3c4c-4e52-9bfa-205f5f67fc05" providerId="ADAL" clId="{DFF75377-3DF0-4A60-90BA-EBCBE8F9083E}" dt="2026-01-31T20:03:38.973" v="5524" actId="338"/>
+          <ac:grpSpMkLst>
+            <pc:docMk/>
+            <pc:sldMk cId="2063007720" sldId="260"/>
+            <ac:grpSpMk id="25" creationId="{3C8B9E7D-226F-4A27-231B-34E88391DEA7}"/>
+          </ac:grpSpMkLst>
+        </pc:grpChg>
+        <pc:grpChg chg="add del mod">
+          <ac:chgData name="Amouzou, Komi Mekaeli" userId="020e202c-3c4c-4e52-9bfa-205f5f67fc05" providerId="ADAL" clId="{DFF75377-3DF0-4A60-90BA-EBCBE8F9083E}" dt="2026-01-31T20:02:20.567" v="5516" actId="165"/>
+          <ac:grpSpMkLst>
+            <pc:docMk/>
+            <pc:sldMk cId="2063007720" sldId="260"/>
+            <ac:grpSpMk id="26" creationId="{9D7A4E03-526C-132D-5223-2448D3181023}"/>
           </ac:grpSpMkLst>
         </pc:grpChg>
         <pc:grpChg chg="add mod">
@@ -1708,14 +1172,6 @@
             <pc:docMk/>
             <pc:sldMk cId="2063007720" sldId="260"/>
             <ac:grpSpMk id="32" creationId="{9B641BC4-4EF7-3E10-70EE-685342A9EC24}"/>
-          </ac:grpSpMkLst>
-        </pc:grpChg>
-        <pc:grpChg chg="add mod">
-          <ac:chgData name="Amouzou, Komi Mekaeli" userId="020e202c-3c4c-4e52-9bfa-205f5f67fc05" providerId="ADAL" clId="{DFF75377-3DF0-4A60-90BA-EBCBE8F9083E}" dt="2026-01-29T07:36:17.265" v="4033" actId="571"/>
-          <ac:grpSpMkLst>
-            <pc:docMk/>
-            <pc:sldMk cId="2063007720" sldId="260"/>
-            <ac:grpSpMk id="37" creationId="{399AEE78-5615-7541-93FC-4C16FE43051D}"/>
           </ac:grpSpMkLst>
         </pc:grpChg>
         <pc:grpChg chg="del mod">
@@ -1735,7 +1191,7 @@
           </ac:grpSpMkLst>
         </pc:grpChg>
         <pc:grpChg chg="mod topLvl">
-          <ac:chgData name="Amouzou, Komi Mekaeli" userId="020e202c-3c4c-4e52-9bfa-205f5f67fc05" providerId="ADAL" clId="{DFF75377-3DF0-4A60-90BA-EBCBE8F9083E}" dt="2026-01-30T11:13:05.781" v="5228" actId="1038"/>
+          <ac:chgData name="Amouzou, Komi Mekaeli" userId="020e202c-3c4c-4e52-9bfa-205f5f67fc05" providerId="ADAL" clId="{DFF75377-3DF0-4A60-90BA-EBCBE8F9083E}" dt="2026-01-31T11:24:40.959" v="5396" actId="554"/>
           <ac:grpSpMkLst>
             <pc:docMk/>
             <pc:sldMk cId="2063007720" sldId="260"/>
@@ -1743,67 +1199,35 @@
           </ac:grpSpMkLst>
         </pc:grpChg>
         <pc:grpChg chg="mod">
-          <ac:chgData name="Amouzou, Komi Mekaeli" userId="020e202c-3c4c-4e52-9bfa-205f5f67fc05" providerId="ADAL" clId="{DFF75377-3DF0-4A60-90BA-EBCBE8F9083E}" dt="2026-01-30T11:13:05.781" v="5228" actId="1038"/>
+          <ac:chgData name="Amouzou, Komi Mekaeli" userId="020e202c-3c4c-4e52-9bfa-205f5f67fc05" providerId="ADAL" clId="{DFF75377-3DF0-4A60-90BA-EBCBE8F9083E}" dt="2026-01-31T11:24:40.959" v="5396" actId="554"/>
           <ac:grpSpMkLst>
             <pc:docMk/>
             <pc:sldMk cId="2063007720" sldId="260"/>
             <ac:grpSpMk id="87" creationId="{0F4C3AF3-F8AA-357C-465D-14D9F75901F6}"/>
           </ac:grpSpMkLst>
         </pc:grpChg>
-        <pc:cxnChg chg="del mod">
-          <ac:chgData name="Amouzou, Komi Mekaeli" userId="020e202c-3c4c-4e52-9bfa-205f5f67fc05" providerId="ADAL" clId="{DFF75377-3DF0-4A60-90BA-EBCBE8F9083E}" dt="2026-01-29T07:46:26.523" v="4144" actId="478"/>
+        <pc:cxnChg chg="add mod">
+          <ac:chgData name="Amouzou, Komi Mekaeli" userId="020e202c-3c4c-4e52-9bfa-205f5f67fc05" providerId="ADAL" clId="{DFF75377-3DF0-4A60-90BA-EBCBE8F9083E}" dt="2026-01-31T11:23:53.006" v="5372" actId="571"/>
           <ac:cxnSpMkLst>
             <pc:docMk/>
             <pc:sldMk cId="2063007720" sldId="260"/>
-            <ac:cxnSpMk id="8" creationId="{89C6349B-7EE9-2FF2-1D21-048458FC4F4E}"/>
-          </ac:cxnSpMkLst>
-        </pc:cxnChg>
-        <pc:cxnChg chg="add del mod">
-          <ac:chgData name="Amouzou, Komi Mekaeli" userId="020e202c-3c4c-4e52-9bfa-205f5f67fc05" providerId="ADAL" clId="{DFF75377-3DF0-4A60-90BA-EBCBE8F9083E}" dt="2026-01-29T07:45:47.190" v="4134" actId="478"/>
-          <ac:cxnSpMkLst>
-            <pc:docMk/>
-            <pc:sldMk cId="2063007720" sldId="260"/>
-            <ac:cxnSpMk id="17" creationId="{40193A97-04D4-5D5E-3E44-6348A08647E7}"/>
-          </ac:cxnSpMkLst>
-        </pc:cxnChg>
-        <pc:cxnChg chg="del mod">
-          <ac:chgData name="Amouzou, Komi Mekaeli" userId="020e202c-3c4c-4e52-9bfa-205f5f67fc05" providerId="ADAL" clId="{DFF75377-3DF0-4A60-90BA-EBCBE8F9083E}" dt="2026-01-29T07:45:34.226" v="4132" actId="478"/>
-          <ac:cxnSpMkLst>
-            <pc:docMk/>
-            <pc:sldMk cId="2063007720" sldId="260"/>
-            <ac:cxnSpMk id="18" creationId="{7BE1E999-77A6-37BC-37D1-AC56BB2DB477}"/>
-          </ac:cxnSpMkLst>
-        </pc:cxnChg>
-        <pc:cxnChg chg="add del mod">
-          <ac:chgData name="Amouzou, Komi Mekaeli" userId="020e202c-3c4c-4e52-9bfa-205f5f67fc05" providerId="ADAL" clId="{DFF75377-3DF0-4A60-90BA-EBCBE8F9083E}" dt="2026-01-29T07:45:32.452" v="4131" actId="478"/>
-          <ac:cxnSpMkLst>
-            <pc:docMk/>
-            <pc:sldMk cId="2063007720" sldId="260"/>
-            <ac:cxnSpMk id="19" creationId="{566C0342-65FB-304E-5D18-19A1D2EEFA26}"/>
-          </ac:cxnSpMkLst>
-        </pc:cxnChg>
-        <pc:cxnChg chg="del mod">
-          <ac:chgData name="Amouzou, Komi Mekaeli" userId="020e202c-3c4c-4e52-9bfa-205f5f67fc05" providerId="ADAL" clId="{DFF75377-3DF0-4A60-90BA-EBCBE8F9083E}" dt="2026-01-29T07:45:49.402" v="4135" actId="478"/>
-          <ac:cxnSpMkLst>
-            <pc:docMk/>
-            <pc:sldMk cId="2063007720" sldId="260"/>
-            <ac:cxnSpMk id="26" creationId="{97957AD8-4728-A267-F997-052FA84830F4}"/>
-          </ac:cxnSpMkLst>
-        </pc:cxnChg>
-        <pc:cxnChg chg="add del mod">
-          <ac:chgData name="Amouzou, Komi Mekaeli" userId="020e202c-3c4c-4e52-9bfa-205f5f67fc05" providerId="ADAL" clId="{DFF75377-3DF0-4A60-90BA-EBCBE8F9083E}" dt="2026-01-29T19:59:57.307" v="4463" actId="478"/>
-          <ac:cxnSpMkLst>
-            <pc:docMk/>
-            <pc:sldMk cId="2063007720" sldId="260"/>
-            <ac:cxnSpMk id="28" creationId="{AB13D059-CA2B-8A1B-B63A-4EA1DFBE46D3}"/>
+            <ac:cxnSpMk id="21" creationId="{ED42E497-FEA9-3FE0-07AE-9874E47B0E34}"/>
           </ac:cxnSpMkLst>
         </pc:cxnChg>
         <pc:cxnChg chg="add mod">
-          <ac:chgData name="Amouzou, Komi Mekaeli" userId="020e202c-3c4c-4e52-9bfa-205f5f67fc05" providerId="ADAL" clId="{DFF75377-3DF0-4A60-90BA-EBCBE8F9083E}" dt="2026-01-29T07:36:17.265" v="4033" actId="571"/>
+          <ac:chgData name="Amouzou, Komi Mekaeli" userId="020e202c-3c4c-4e52-9bfa-205f5f67fc05" providerId="ADAL" clId="{DFF75377-3DF0-4A60-90BA-EBCBE8F9083E}" dt="2026-01-31T11:24:23.565" v="5381" actId="554"/>
           <ac:cxnSpMkLst>
             <pc:docMk/>
             <pc:sldMk cId="2063007720" sldId="260"/>
-            <ac:cxnSpMk id="36" creationId="{75630E0A-0F83-B797-8902-904F921A8685}"/>
+            <ac:cxnSpMk id="22" creationId="{30E122C9-B072-721A-FBC9-3515D9E99E4A}"/>
+          </ac:cxnSpMkLst>
+        </pc:cxnChg>
+        <pc:cxnChg chg="add mod">
+          <ac:chgData name="Amouzou, Komi Mekaeli" userId="020e202c-3c4c-4e52-9bfa-205f5f67fc05" providerId="ADAL" clId="{DFF75377-3DF0-4A60-90BA-EBCBE8F9083E}" dt="2026-01-31T11:26:23.733" v="5400" actId="571"/>
+          <ac:cxnSpMkLst>
+            <pc:docMk/>
+            <pc:sldMk cId="2063007720" sldId="260"/>
+            <ac:cxnSpMk id="23" creationId="{70739F5E-A2FE-9A39-234B-4485F8955C18}"/>
           </ac:cxnSpMkLst>
         </pc:cxnChg>
         <pc:cxnChg chg="add mod">
@@ -1823,7 +1247,7 @@
           </ac:cxnSpMkLst>
         </pc:cxnChg>
         <pc:cxnChg chg="add mod">
-          <ac:chgData name="Amouzou, Komi Mekaeli" userId="020e202c-3c4c-4e52-9bfa-205f5f67fc05" providerId="ADAL" clId="{DFF75377-3DF0-4A60-90BA-EBCBE8F9083E}" dt="2026-01-30T11:13:05.781" v="5228" actId="1038"/>
+          <ac:chgData name="Amouzou, Komi Mekaeli" userId="020e202c-3c4c-4e52-9bfa-205f5f67fc05" providerId="ADAL" clId="{DFF75377-3DF0-4A60-90BA-EBCBE8F9083E}" dt="2026-01-31T11:24:23.565" v="5381" actId="554"/>
           <ac:cxnSpMkLst>
             <pc:docMk/>
             <pc:sldMk cId="2063007720" sldId="260"/>
@@ -1838,30 +1262,6 @@
             <ac:cxnSpMk id="44" creationId="{157E77A1-0C8E-0729-770A-10BC85B19DA7}"/>
           </ac:cxnSpMkLst>
         </pc:cxnChg>
-        <pc:cxnChg chg="add del mod">
-          <ac:chgData name="Amouzou, Komi Mekaeli" userId="020e202c-3c4c-4e52-9bfa-205f5f67fc05" providerId="ADAL" clId="{DFF75377-3DF0-4A60-90BA-EBCBE8F9083E}" dt="2026-01-29T07:48:27.363" v="4161" actId="478"/>
-          <ac:cxnSpMkLst>
-            <pc:docMk/>
-            <pc:sldMk cId="2063007720" sldId="260"/>
-            <ac:cxnSpMk id="45" creationId="{002DCF8D-CB58-D049-7840-1560A0CC6E27}"/>
-          </ac:cxnSpMkLst>
-        </pc:cxnChg>
-        <pc:cxnChg chg="add mod">
-          <ac:chgData name="Amouzou, Komi Mekaeli" userId="020e202c-3c4c-4e52-9bfa-205f5f67fc05" providerId="ADAL" clId="{DFF75377-3DF0-4A60-90BA-EBCBE8F9083E}" dt="2026-01-29T07:47:31.255" v="4151" actId="571"/>
-          <ac:cxnSpMkLst>
-            <pc:docMk/>
-            <pc:sldMk cId="2063007720" sldId="260"/>
-            <ac:cxnSpMk id="46" creationId="{97203FCD-3F67-EBA3-ABA8-63FF278315E0}"/>
-          </ac:cxnSpMkLst>
-        </pc:cxnChg>
-        <pc:cxnChg chg="add mod">
-          <ac:chgData name="Amouzou, Komi Mekaeli" userId="020e202c-3c4c-4e52-9bfa-205f5f67fc05" providerId="ADAL" clId="{DFF75377-3DF0-4A60-90BA-EBCBE8F9083E}" dt="2026-01-29T07:47:31.255" v="4151" actId="571"/>
-          <ac:cxnSpMkLst>
-            <pc:docMk/>
-            <pc:sldMk cId="2063007720" sldId="260"/>
-            <ac:cxnSpMk id="47" creationId="{035796DA-0FF6-BBCC-03D5-A2F0E764FC07}"/>
-          </ac:cxnSpMkLst>
-        </pc:cxnChg>
         <pc:cxnChg chg="mod">
           <ac:chgData name="Amouzou, Komi Mekaeli" userId="020e202c-3c4c-4e52-9bfa-205f5f67fc05" providerId="ADAL" clId="{DFF75377-3DF0-4A60-90BA-EBCBE8F9083E}" dt="2026-01-30T09:17:15.765" v="4807" actId="164"/>
           <ac:cxnSpMkLst>
@@ -1870,8 +1270,8 @@
             <ac:cxnSpMk id="51" creationId="{969E8B34-8119-4CDD-92DC-9981BCD9D12C}"/>
           </ac:cxnSpMkLst>
         </pc:cxnChg>
-        <pc:cxnChg chg="mod">
-          <ac:chgData name="Amouzou, Komi Mekaeli" userId="020e202c-3c4c-4e52-9bfa-205f5f67fc05" providerId="ADAL" clId="{DFF75377-3DF0-4A60-90BA-EBCBE8F9083E}" dt="2026-01-30T09:14:42.555" v="4738" actId="164"/>
+        <pc:cxnChg chg="del mod topLvl">
+          <ac:chgData name="Amouzou, Komi Mekaeli" userId="020e202c-3c4c-4e52-9bfa-205f5f67fc05" providerId="ADAL" clId="{DFF75377-3DF0-4A60-90BA-EBCBE8F9083E}" dt="2026-01-31T11:26:11.504" v="5399" actId="478"/>
           <ac:cxnSpMkLst>
             <pc:docMk/>
             <pc:sldMk cId="2063007720" sldId="260"/>
@@ -1879,23 +1279,7 @@
           </ac:cxnSpMkLst>
         </pc:cxnChg>
         <pc:cxnChg chg="del mod">
-          <ac:chgData name="Amouzou, Komi Mekaeli" userId="020e202c-3c4c-4e52-9bfa-205f5f67fc05" providerId="ADAL" clId="{DFF75377-3DF0-4A60-90BA-EBCBE8F9083E}" dt="2026-01-29T07:46:25.218" v="4143" actId="478"/>
-          <ac:cxnSpMkLst>
-            <pc:docMk/>
-            <pc:sldMk cId="2063007720" sldId="260"/>
-            <ac:cxnSpMk id="64" creationId="{2DE9D9E6-97ED-268B-3EA4-D17FAF92FD7D}"/>
-          </ac:cxnSpMkLst>
-        </pc:cxnChg>
-        <pc:cxnChg chg="del mod">
-          <ac:chgData name="Amouzou, Komi Mekaeli" userId="020e202c-3c4c-4e52-9bfa-205f5f67fc05" providerId="ADAL" clId="{DFF75377-3DF0-4A60-90BA-EBCBE8F9083E}" dt="2026-01-29T07:30:24.967" v="3998" actId="478"/>
-          <ac:cxnSpMkLst>
-            <pc:docMk/>
-            <pc:sldMk cId="2063007720" sldId="260"/>
-            <ac:cxnSpMk id="71" creationId="{375E43DA-2E92-142C-9B2F-E9DFB3630A11}"/>
-          </ac:cxnSpMkLst>
-        </pc:cxnChg>
-        <pc:cxnChg chg="mod">
-          <ac:chgData name="Amouzou, Komi Mekaeli" userId="020e202c-3c4c-4e52-9bfa-205f5f67fc05" providerId="ADAL" clId="{DFF75377-3DF0-4A60-90BA-EBCBE8F9083E}" dt="2026-01-30T11:13:13.581" v="5239" actId="1038"/>
+          <ac:chgData name="Amouzou, Komi Mekaeli" userId="020e202c-3c4c-4e52-9bfa-205f5f67fc05" providerId="ADAL" clId="{DFF75377-3DF0-4A60-90BA-EBCBE8F9083E}" dt="2026-01-31T11:24:46.391" v="5397" actId="478"/>
           <ac:cxnSpMkLst>
             <pc:docMk/>
             <pc:sldMk cId="2063007720" sldId="260"/>
@@ -2055,7 +1439,7 @@
           <a:p>
             <a:fld id="{7BC05856-D372-4018-954A-406ED84378D1}" type="datetimeFigureOut">
               <a:rPr lang="fr-FR" smtClean="0"/>
-              <a:t>30/01/2026</a:t>
+              <a:t>31/01/2026</a:t>
             </a:fld>
             <a:endParaRPr lang="fr-FR"/>
           </a:p>
@@ -2253,7 +1637,7 @@
           <a:p>
             <a:fld id="{7BC05856-D372-4018-954A-406ED84378D1}" type="datetimeFigureOut">
               <a:rPr lang="fr-FR" smtClean="0"/>
-              <a:t>30/01/2026</a:t>
+              <a:t>31/01/2026</a:t>
             </a:fld>
             <a:endParaRPr lang="fr-FR"/>
           </a:p>
@@ -2461,7 +1845,7 @@
           <a:p>
             <a:fld id="{7BC05856-D372-4018-954A-406ED84378D1}" type="datetimeFigureOut">
               <a:rPr lang="fr-FR" smtClean="0"/>
-              <a:t>30/01/2026</a:t>
+              <a:t>31/01/2026</a:t>
             </a:fld>
             <a:endParaRPr lang="fr-FR"/>
           </a:p>
@@ -2659,7 +2043,7 @@
           <a:p>
             <a:fld id="{7BC05856-D372-4018-954A-406ED84378D1}" type="datetimeFigureOut">
               <a:rPr lang="fr-FR" smtClean="0"/>
-              <a:t>30/01/2026</a:t>
+              <a:t>31/01/2026</a:t>
             </a:fld>
             <a:endParaRPr lang="fr-FR"/>
           </a:p>
@@ -2934,7 +2318,7 @@
           <a:p>
             <a:fld id="{7BC05856-D372-4018-954A-406ED84378D1}" type="datetimeFigureOut">
               <a:rPr lang="fr-FR" smtClean="0"/>
-              <a:t>30/01/2026</a:t>
+              <a:t>31/01/2026</a:t>
             </a:fld>
             <a:endParaRPr lang="fr-FR"/>
           </a:p>
@@ -3199,7 +2583,7 @@
           <a:p>
             <a:fld id="{7BC05856-D372-4018-954A-406ED84378D1}" type="datetimeFigureOut">
               <a:rPr lang="fr-FR" smtClean="0"/>
-              <a:t>30/01/2026</a:t>
+              <a:t>31/01/2026</a:t>
             </a:fld>
             <a:endParaRPr lang="fr-FR"/>
           </a:p>
@@ -3611,7 +2995,7 @@
           <a:p>
             <a:fld id="{7BC05856-D372-4018-954A-406ED84378D1}" type="datetimeFigureOut">
               <a:rPr lang="fr-FR" smtClean="0"/>
-              <a:t>30/01/2026</a:t>
+              <a:t>31/01/2026</a:t>
             </a:fld>
             <a:endParaRPr lang="fr-FR"/>
           </a:p>
@@ -3752,7 +3136,7 @@
           <a:p>
             <a:fld id="{7BC05856-D372-4018-954A-406ED84378D1}" type="datetimeFigureOut">
               <a:rPr lang="fr-FR" smtClean="0"/>
-              <a:t>30/01/2026</a:t>
+              <a:t>31/01/2026</a:t>
             </a:fld>
             <a:endParaRPr lang="fr-FR"/>
           </a:p>
@@ -3865,7 +3249,7 @@
           <a:p>
             <a:fld id="{7BC05856-D372-4018-954A-406ED84378D1}" type="datetimeFigureOut">
               <a:rPr lang="fr-FR" smtClean="0"/>
-              <a:t>30/01/2026</a:t>
+              <a:t>31/01/2026</a:t>
             </a:fld>
             <a:endParaRPr lang="fr-FR"/>
           </a:p>
@@ -4176,7 +3560,7 @@
           <a:p>
             <a:fld id="{7BC05856-D372-4018-954A-406ED84378D1}" type="datetimeFigureOut">
               <a:rPr lang="fr-FR" smtClean="0"/>
-              <a:t>30/01/2026</a:t>
+              <a:t>31/01/2026</a:t>
             </a:fld>
             <a:endParaRPr lang="fr-FR"/>
           </a:p>
@@ -4464,7 +3848,7 @@
           <a:p>
             <a:fld id="{7BC05856-D372-4018-954A-406ED84378D1}" type="datetimeFigureOut">
               <a:rPr lang="fr-FR" smtClean="0"/>
-              <a:t>30/01/2026</a:t>
+              <a:t>31/01/2026</a:t>
             </a:fld>
             <a:endParaRPr lang="fr-FR"/>
           </a:p>
@@ -4705,7 +4089,7 @@
           <a:p>
             <a:fld id="{7BC05856-D372-4018-954A-406ED84378D1}" type="datetimeFigureOut">
               <a:rPr lang="fr-FR" smtClean="0"/>
-              <a:t>30/01/2026</a:t>
+              <a:t>31/01/2026</a:t>
             </a:fld>
             <a:endParaRPr lang="fr-FR"/>
           </a:p>
@@ -9610,7 +8994,7 @@
         </p:nvSpPr>
         <p:spPr>
           <a:xfrm>
-            <a:off x="8371965" y="1955371"/>
+            <a:off x="8371965" y="1927939"/>
             <a:ext cx="877824" cy="276999"/>
           </a:xfrm>
           <a:prstGeom prst="rect">
@@ -9887,10 +9271,10 @@
       </p:grpSp>
       <p:grpSp>
         <p:nvGrpSpPr>
-          <p:cNvPr id="8" name="Groupe 7">
+          <p:cNvPr id="15" name="Groupe 14">
             <a:extLst>
               <a:ext uri="{FF2B5EF4-FFF2-40B4-BE49-F238E27FC236}">
-                <a16:creationId xmlns:a16="http://schemas.microsoft.com/office/drawing/2014/main" id="{1966FFE8-0F64-2C5C-CB24-86BE3421DEBB}"/>
+                <a16:creationId xmlns:a16="http://schemas.microsoft.com/office/drawing/2014/main" id="{5760850F-E3BE-E5DD-C476-023AA830CC88}"/>
               </a:ext>
             </a:extLst>
           </p:cNvPr>
@@ -9899,68 +9283,12 @@
         </p:nvGrpSpPr>
         <p:grpSpPr>
           <a:xfrm>
-            <a:off x="7828278" y="2570923"/>
-            <a:ext cx="1677923" cy="1138775"/>
-            <a:chOff x="8499943" y="2932766"/>
-            <a:chExt cx="1677923" cy="1138775"/>
+            <a:off x="8171180" y="2543491"/>
+            <a:ext cx="1280159" cy="1377309"/>
+            <a:chOff x="8171180" y="2543491"/>
+            <a:chExt cx="1280159" cy="1377309"/>
           </a:xfrm>
         </p:grpSpPr>
-        <p:sp>
-          <p:nvSpPr>
-            <p:cNvPr id="55" name="ZoneTexte 54">
-              <a:extLst>
-                <a:ext uri="{FF2B5EF4-FFF2-40B4-BE49-F238E27FC236}">
-                  <a16:creationId xmlns:a16="http://schemas.microsoft.com/office/drawing/2014/main" id="{E63BCD74-4A58-A5A1-E6E5-3D16B9D2A40A}"/>
-                </a:ext>
-              </a:extLst>
-            </p:cNvPr>
-            <p:cNvSpPr txBox="1"/>
-            <p:nvPr/>
-          </p:nvSpPr>
-          <p:spPr>
-            <a:xfrm>
-              <a:off x="8897707" y="3240544"/>
-              <a:ext cx="1280159" cy="830997"/>
-            </a:xfrm>
-            <a:prstGeom prst="rect">
-              <a:avLst/>
-            </a:prstGeom>
-            <a:noFill/>
-          </p:spPr>
-          <p:txBody>
-            <a:bodyPr wrap="square" rtlCol="0">
-              <a:spAutoFit/>
-            </a:bodyPr>
-            <a:lstStyle/>
-            <a:p>
-              <a:r>
-                <a:rPr lang="fr-CA" sz="1200" dirty="0" err="1"/>
-                <a:t>Read_param</a:t>
-              </a:r>
-              <a:endParaRPr lang="fr-CA" sz="1200" dirty="0"/>
-            </a:p>
-            <a:p>
-              <a:r>
-                <a:rPr lang="fr-CA" sz="1200" dirty="0" err="1"/>
-                <a:t>Write_param</a:t>
-              </a:r>
-              <a:endParaRPr lang="fr-CA" sz="1200" dirty="0"/>
-            </a:p>
-            <a:p>
-              <a:r>
-                <a:rPr lang="fr-CA" sz="1200" dirty="0"/>
-                <a:t>Supprime ligne</a:t>
-              </a:r>
-            </a:p>
-            <a:p>
-              <a:r>
-                <a:rPr lang="fr-CA" sz="1200" dirty="0"/>
-                <a:t>Paramètres.txt </a:t>
-              </a:r>
-              <a:endParaRPr lang="fr-FR" sz="1200" dirty="0"/>
-            </a:p>
-          </p:txBody>
-        </p:sp>
         <p:sp>
           <p:nvSpPr>
             <p:cNvPr id="56" name="Rectangle 55">
@@ -9975,8 +9303,8 @@
           </p:nvSpPr>
           <p:spPr>
             <a:xfrm>
-              <a:off x="8897709" y="2932766"/>
-              <a:ext cx="1280157" cy="1138765"/>
+              <a:off x="8171180" y="2543491"/>
+              <a:ext cx="1280157" cy="1377309"/>
             </a:xfrm>
             <a:prstGeom prst="rect">
               <a:avLst/>
@@ -10008,96 +9336,138 @@
             </a:p>
           </p:txBody>
         </p:sp>
-        <p:sp>
-          <p:nvSpPr>
-            <p:cNvPr id="57" name="ZoneTexte 56">
+        <p:grpSp>
+          <p:nvGrpSpPr>
+            <p:cNvPr id="25" name="Groupe 24">
               <a:extLst>
                 <a:ext uri="{FF2B5EF4-FFF2-40B4-BE49-F238E27FC236}">
-                  <a16:creationId xmlns:a16="http://schemas.microsoft.com/office/drawing/2014/main" id="{43148B3D-D1E4-B429-7D5D-FA33F9AA5A71}"/>
+                  <a16:creationId xmlns:a16="http://schemas.microsoft.com/office/drawing/2014/main" id="{3C8B9E7D-226F-4A27-231B-34E88391DEA7}"/>
                 </a:ext>
               </a:extLst>
             </p:cNvPr>
-            <p:cNvSpPr txBox="1"/>
+            <p:cNvGrpSpPr/>
             <p:nvPr/>
-          </p:nvSpPr>
-          <p:spPr>
+          </p:nvGrpSpPr>
+          <p:grpSpPr>
             <a:xfrm>
-              <a:off x="8906851" y="2932767"/>
-              <a:ext cx="1256540" cy="307777"/>
+              <a:off x="8171180" y="2543491"/>
+              <a:ext cx="1280159" cy="1323440"/>
+              <a:chOff x="8226044" y="2596011"/>
+              <a:chExt cx="1280159" cy="1323440"/>
             </a:xfrm>
-            <a:prstGeom prst="rect">
-              <a:avLst/>
-            </a:prstGeom>
-            <a:noFill/>
-            <a:ln w="3175">
-              <a:solidFill>
-                <a:schemeClr val="tx1"/>
-              </a:solidFill>
-            </a:ln>
-          </p:spPr>
-          <p:txBody>
-            <a:bodyPr wrap="square" rtlCol="0">
-              <a:spAutoFit/>
-            </a:bodyPr>
-            <a:lstStyle/>
-            <a:p>
-              <a:r>
-                <a:rPr lang="fr-CA" sz="1400" dirty="0">
+          </p:grpSpPr>
+          <p:sp>
+            <p:nvSpPr>
+              <p:cNvPr id="55" name="ZoneTexte 54">
+                <a:extLst>
+                  <a:ext uri="{FF2B5EF4-FFF2-40B4-BE49-F238E27FC236}">
+                    <a16:creationId xmlns:a16="http://schemas.microsoft.com/office/drawing/2014/main" id="{E63BCD74-4A58-A5A1-E6E5-3D16B9D2A40A}"/>
+                  </a:ext>
+                </a:extLst>
+              </p:cNvPr>
+              <p:cNvSpPr txBox="1"/>
+              <p:nvPr/>
+            </p:nvSpPr>
+            <p:spPr>
+              <a:xfrm>
+                <a:off x="8226044" y="2903788"/>
+                <a:ext cx="1280159" cy="1015663"/>
+              </a:xfrm>
+              <a:prstGeom prst="rect">
+                <a:avLst/>
+              </a:prstGeom>
+              <a:noFill/>
+            </p:spPr>
+            <p:txBody>
+              <a:bodyPr wrap="square" rtlCol="0">
+                <a:spAutoFit/>
+              </a:bodyPr>
+              <a:lstStyle/>
+              <a:p>
+                <a:r>
+                  <a:rPr lang="fr-CA" sz="1200" dirty="0" err="1"/>
+                  <a:t>Read_param</a:t>
+                </a:r>
+                <a:endParaRPr lang="fr-CA" sz="1200" dirty="0"/>
+              </a:p>
+              <a:p>
+                <a:r>
+                  <a:rPr lang="fr-CA" sz="1200" dirty="0" err="1"/>
+                  <a:t>Write_param</a:t>
+                </a:r>
+                <a:endParaRPr lang="fr-CA" sz="1200" dirty="0"/>
+              </a:p>
+              <a:p>
+                <a:r>
+                  <a:rPr lang="fr-CA" sz="1200" dirty="0"/>
+                  <a:t>Supprime ligne</a:t>
+                </a:r>
+              </a:p>
+              <a:p>
+                <a:r>
+                  <a:rPr lang="fr-CA" sz="1200" dirty="0"/>
+                  <a:t>Paramètres.txt </a:t>
+                </a:r>
+              </a:p>
+              <a:p>
+                <a:r>
+                  <a:rPr lang="fr-CA" sz="1200" dirty="0"/>
+                  <a:t>Fonction max</a:t>
+                </a:r>
+                <a:endParaRPr lang="fr-FR" sz="1200" dirty="0"/>
+              </a:p>
+            </p:txBody>
+          </p:sp>
+          <p:sp>
+            <p:nvSpPr>
+              <p:cNvPr id="57" name="ZoneTexte 56">
+                <a:extLst>
+                  <a:ext uri="{FF2B5EF4-FFF2-40B4-BE49-F238E27FC236}">
+                    <a16:creationId xmlns:a16="http://schemas.microsoft.com/office/drawing/2014/main" id="{43148B3D-D1E4-B429-7D5D-FA33F9AA5A71}"/>
+                  </a:ext>
+                </a:extLst>
+              </p:cNvPr>
+              <p:cNvSpPr txBox="1"/>
+              <p:nvPr/>
+            </p:nvSpPr>
+            <p:spPr>
+              <a:xfrm>
+                <a:off x="8235188" y="2596011"/>
+                <a:ext cx="1256540" cy="307777"/>
+              </a:xfrm>
+              <a:prstGeom prst="rect">
+                <a:avLst/>
+              </a:prstGeom>
+              <a:noFill/>
+              <a:ln w="3175">
+                <a:solidFill>
+                  <a:schemeClr val="tx1"/>
+                </a:solidFill>
+              </a:ln>
+            </p:spPr>
+            <p:txBody>
+              <a:bodyPr wrap="square" rtlCol="0">
+                <a:spAutoFit/>
+              </a:bodyPr>
+              <a:lstStyle/>
+              <a:p>
+                <a:r>
+                  <a:rPr lang="fr-CA" sz="1400" dirty="0">
+                    <a:highlight>
+                      <a:srgbClr val="FFFF00"/>
+                    </a:highlight>
+                  </a:rPr>
+                  <a:t>service</a:t>
+                </a:r>
+                <a:endParaRPr lang="fr-FR" sz="1400" dirty="0">
                   <a:highlight>
                     <a:srgbClr val="FFFF00"/>
                   </a:highlight>
-                </a:rPr>
-                <a:t>service</a:t>
-              </a:r>
-              <a:endParaRPr lang="fr-FR" sz="1400" dirty="0">
-                <a:highlight>
-                  <a:srgbClr val="FFFF00"/>
-                </a:highlight>
-              </a:endParaRPr>
-            </a:p>
-          </p:txBody>
-        </p:sp>
-        <p:cxnSp>
-          <p:nvCxnSpPr>
-            <p:cNvPr id="58" name="Connecteur droit avec flèche 57">
-              <a:extLst>
-                <a:ext uri="{FF2B5EF4-FFF2-40B4-BE49-F238E27FC236}">
-                  <a16:creationId xmlns:a16="http://schemas.microsoft.com/office/drawing/2014/main" id="{AA7F4B58-7D72-BF37-7327-4E66FDD2DCDB}"/>
-                </a:ext>
-              </a:extLst>
-            </p:cNvPr>
-            <p:cNvCxnSpPr>
-              <a:cxnSpLocks/>
-            </p:cNvCxnSpPr>
-            <p:nvPr/>
-          </p:nvCxnSpPr>
-          <p:spPr>
-            <a:xfrm>
-              <a:off x="8499943" y="3064218"/>
-              <a:ext cx="397764" cy="0"/>
-            </a:xfrm>
-            <a:prstGeom prst="straightConnector1">
-              <a:avLst/>
-            </a:prstGeom>
-            <a:ln>
-              <a:tailEnd type="triangle"/>
-            </a:ln>
-          </p:spPr>
-          <p:style>
-            <a:lnRef idx="2">
-              <a:schemeClr val="accent1"/>
-            </a:lnRef>
-            <a:fillRef idx="0">
-              <a:schemeClr val="accent1"/>
-            </a:fillRef>
-            <a:effectRef idx="1">
-              <a:schemeClr val="accent1"/>
-            </a:effectRef>
-            <a:fontRef idx="minor">
-              <a:schemeClr val="tx1"/>
-            </a:fontRef>
-          </p:style>
-        </p:cxnSp>
+                </a:endParaRPr>
+              </a:p>
+            </p:txBody>
+          </p:sp>
+        </p:grpSp>
       </p:grpSp>
       <p:sp>
         <p:nvSpPr>
@@ -10188,7 +9558,7 @@
         <p:spPr>
           <a:xfrm>
             <a:off x="4103432" y="4305095"/>
-            <a:ext cx="3695123" cy="1384995"/>
+            <a:ext cx="3695123" cy="1754326"/>
           </a:xfrm>
           <a:prstGeom prst="rect">
             <a:avLst/>
@@ -10252,12 +9622,8 @@
               <a:buChar char="•"/>
             </a:pPr>
             <a:r>
-              <a:rPr lang="fr-CA" sz="1200" dirty="0" err="1"/>
-              <a:t>eta</a:t>
-            </a:r>
-            <a:r>
               <a:rPr lang="fr-CA" sz="1200" dirty="0"/>
-              <a:t> modifiable</a:t>
+              <a:t>êta modifiable</a:t>
             </a:r>
           </a:p>
           <a:p>
@@ -10278,6 +9644,16 @@
             <a:r>
               <a:rPr lang="fr-CA" sz="1200" dirty="0"/>
               <a:t>Ajout option test unitaire</a:t>
+            </a:r>
+          </a:p>
+          <a:p>
+            <a:pPr marL="171450" indent="-171450">
+              <a:buFont typeface="Arial" panose="020B0604020202020204" pitchFamily="34" charset="0"/>
+              <a:buChar char="•"/>
+            </a:pPr>
+            <a:r>
+              <a:rPr lang="fr-CA" sz="1200" dirty="0"/>
+              <a:t>Enregistrement(ajout/sup/chargement) des configurations (service)</a:t>
             </a:r>
           </a:p>
         </p:txBody>
@@ -11199,7 +10575,7 @@
         </p:nvGrpSpPr>
         <p:grpSpPr>
           <a:xfrm>
-            <a:off x="2476375" y="4383617"/>
+            <a:off x="844172" y="3155819"/>
             <a:ext cx="1280159" cy="1138776"/>
             <a:chOff x="1287757" y="4489149"/>
             <a:chExt cx="1280159" cy="1138776"/>
@@ -11374,48 +10750,6 @@
       </p:grpSp>
       <p:cxnSp>
         <p:nvCxnSpPr>
-          <p:cNvPr id="80" name="Connecteur droit avec flèche 79">
-            <a:extLst>
-              <a:ext uri="{FF2B5EF4-FFF2-40B4-BE49-F238E27FC236}">
-                <a16:creationId xmlns:a16="http://schemas.microsoft.com/office/drawing/2014/main" id="{8D6AA715-FF6C-18B1-57A5-F91B93981C71}"/>
-              </a:ext>
-            </a:extLst>
-          </p:cNvPr>
-          <p:cNvCxnSpPr>
-            <a:cxnSpLocks/>
-          </p:cNvCxnSpPr>
-          <p:nvPr/>
-        </p:nvCxnSpPr>
-        <p:spPr>
-          <a:xfrm>
-            <a:off x="3170920" y="4109927"/>
-            <a:ext cx="0" cy="292388"/>
-          </a:xfrm>
-          <a:prstGeom prst="straightConnector1">
-            <a:avLst/>
-          </a:prstGeom>
-          <a:ln>
-            <a:headEnd type="triangle"/>
-            <a:tailEnd type="triangle"/>
-          </a:ln>
-        </p:spPr>
-        <p:style>
-          <a:lnRef idx="2">
-            <a:schemeClr val="accent1"/>
-          </a:lnRef>
-          <a:fillRef idx="0">
-            <a:schemeClr val="accent1"/>
-          </a:fillRef>
-          <a:effectRef idx="1">
-            <a:schemeClr val="accent1"/>
-          </a:effectRef>
-          <a:fontRef idx="minor">
-            <a:schemeClr val="tx1"/>
-          </a:fontRef>
-        </p:style>
-      </p:cxnSp>
-      <p:cxnSp>
-        <p:nvCxnSpPr>
           <p:cNvPr id="43" name="Connecteur droit avec flèche 42">
             <a:extLst>
               <a:ext uri="{FF2B5EF4-FFF2-40B4-BE49-F238E27FC236}">
@@ -11430,7 +10764,7 @@
         </p:nvCxnSpPr>
         <p:spPr>
           <a:xfrm flipH="1">
-            <a:off x="3763394" y="3309186"/>
+            <a:off x="3763394" y="3290898"/>
             <a:ext cx="360426" cy="0"/>
           </a:xfrm>
           <a:prstGeom prst="straightConnector1">
@@ -11473,6 +10807,90 @@
         <p:spPr>
           <a:xfrm flipH="1">
             <a:off x="3764344" y="2102089"/>
+            <a:ext cx="360426" cy="0"/>
+          </a:xfrm>
+          <a:prstGeom prst="straightConnector1">
+            <a:avLst/>
+          </a:prstGeom>
+          <a:ln>
+            <a:headEnd type="triangle"/>
+            <a:tailEnd type="triangle"/>
+          </a:ln>
+        </p:spPr>
+        <p:style>
+          <a:lnRef idx="2">
+            <a:schemeClr val="accent1"/>
+          </a:lnRef>
+          <a:fillRef idx="0">
+            <a:schemeClr val="accent1"/>
+          </a:fillRef>
+          <a:effectRef idx="1">
+            <a:schemeClr val="accent1"/>
+          </a:effectRef>
+          <a:fontRef idx="minor">
+            <a:schemeClr val="tx1"/>
+          </a:fontRef>
+        </p:style>
+      </p:cxnSp>
+      <p:cxnSp>
+        <p:nvCxnSpPr>
+          <p:cNvPr id="22" name="Connecteur droit avec flèche 21">
+            <a:extLst>
+              <a:ext uri="{FF2B5EF4-FFF2-40B4-BE49-F238E27FC236}">
+                <a16:creationId xmlns:a16="http://schemas.microsoft.com/office/drawing/2014/main" id="{30E122C9-B072-721A-FBC9-3515D9E99E4A}"/>
+              </a:ext>
+            </a:extLst>
+          </p:cNvPr>
+          <p:cNvCxnSpPr>
+            <a:cxnSpLocks/>
+          </p:cNvCxnSpPr>
+          <p:nvPr/>
+        </p:nvCxnSpPr>
+        <p:spPr>
+          <a:xfrm flipH="1">
+            <a:off x="2123759" y="3290898"/>
+            <a:ext cx="360426" cy="0"/>
+          </a:xfrm>
+          <a:prstGeom prst="straightConnector1">
+            <a:avLst/>
+          </a:prstGeom>
+          <a:ln>
+            <a:headEnd type="triangle"/>
+            <a:tailEnd type="triangle"/>
+          </a:ln>
+        </p:spPr>
+        <p:style>
+          <a:lnRef idx="2">
+            <a:schemeClr val="accent1"/>
+          </a:lnRef>
+          <a:fillRef idx="0">
+            <a:schemeClr val="accent1"/>
+          </a:fillRef>
+          <a:effectRef idx="1">
+            <a:schemeClr val="accent1"/>
+          </a:effectRef>
+          <a:fontRef idx="minor">
+            <a:schemeClr val="tx1"/>
+          </a:fontRef>
+        </p:style>
+      </p:cxnSp>
+      <p:cxnSp>
+        <p:nvCxnSpPr>
+          <p:cNvPr id="23" name="Connecteur droit avec flèche 22">
+            <a:extLst>
+              <a:ext uri="{FF2B5EF4-FFF2-40B4-BE49-F238E27FC236}">
+                <a16:creationId xmlns:a16="http://schemas.microsoft.com/office/drawing/2014/main" id="{70739F5E-A2FE-9A39-234B-4485F8955C18}"/>
+              </a:ext>
+            </a:extLst>
+          </p:cNvPr>
+          <p:cNvCxnSpPr>
+            <a:cxnSpLocks/>
+          </p:cNvCxnSpPr>
+          <p:nvPr/>
+        </p:nvCxnSpPr>
+        <p:spPr>
+          <a:xfrm flipH="1">
+            <a:off x="7810753" y="2705682"/>
             <a:ext cx="360426" cy="0"/>
           </a:xfrm>
           <a:prstGeom prst="straightConnector1">

</xml_diff>

<commit_message>
Refactor lab1: imports relatifs, nettoyage docs, lisibilité
</commit_message>
<xml_diff>
--- a/1_Laboratoire MLP/projet1.pptx
+++ b/1_Laboratoire MLP/projet1.pptx
@@ -118,7 +118,7 @@
 <file path=ppt/revisionInfo.xml><?xml version="1.0" encoding="utf-8"?>
 <p1510:revInfo xmlns:a="http://schemas.openxmlformats.org/drawingml/2006/main" xmlns:r="http://schemas.openxmlformats.org/officeDocument/2006/relationships" xmlns:p1510="http://schemas.microsoft.com/office/powerpoint/2015/10/main">
   <p1510:revLst>
-    <p1510:client id="{F96CE3ED-AA27-400A-A742-2C84F99BCB89}" v="32" dt="2026-01-31T20:03:38.973"/>
+    <p1510:client id="{F96CE3ED-AA27-400A-A742-2C84F99BCB89}" v="33" dt="2026-02-01T08:21:39.309"/>
   </p1510:revLst>
 </p1510:revInfo>
 </file>
@@ -128,7 +128,7 @@
   <pc:docChgLst>
     <pc:chgData name="Amouzou, Komi Mekaeli" userId="020e202c-3c4c-4e52-9bfa-205f5f67fc05" providerId="ADAL" clId="{DFF75377-3DF0-4A60-90BA-EBCBE8F9083E}"/>
     <pc:docChg chg="undo custSel addSld delSld modSld sldOrd">
-      <pc:chgData name="Amouzou, Komi Mekaeli" userId="020e202c-3c4c-4e52-9bfa-205f5f67fc05" providerId="ADAL" clId="{DFF75377-3DF0-4A60-90BA-EBCBE8F9083E}" dt="2026-01-31T20:09:01.118" v="5527" actId="313"/>
+      <pc:chgData name="Amouzou, Komi Mekaeli" userId="020e202c-3c4c-4e52-9bfa-205f5f67fc05" providerId="ADAL" clId="{DFF75377-3DF0-4A60-90BA-EBCBE8F9083E}" dt="2026-02-01T08:22:15.825" v="5598" actId="20577"/>
       <pc:docMkLst>
         <pc:docMk/>
       </pc:docMkLst>
@@ -714,13 +714,6 @@
             <ac:grpSpMk id="150" creationId="{23EEF752-436F-A9E4-3CAC-643966C02F4E}"/>
           </ac:grpSpMkLst>
         </pc:grpChg>
-      </pc:sldChg>
-      <pc:sldChg chg="addSp delSp modSp new del mod ord">
-        <pc:chgData name="Amouzou, Komi Mekaeli" userId="020e202c-3c4c-4e52-9bfa-205f5f67fc05" providerId="ADAL" clId="{DFF75377-3DF0-4A60-90BA-EBCBE8F9083E}" dt="2026-01-30T09:44:41.669" v="5067" actId="47"/>
-        <pc:sldMkLst>
-          <pc:docMk/>
-          <pc:sldMk cId="3433642152" sldId="257"/>
-        </pc:sldMkLst>
       </pc:sldChg>
       <pc:sldChg chg="addSp delSp modSp new mod">
         <pc:chgData name="Amouzou, Komi Mekaeli" userId="020e202c-3c4c-4e52-9bfa-205f5f67fc05" providerId="ADAL" clId="{DFF75377-3DF0-4A60-90BA-EBCBE8F9083E}" dt="2026-01-29T03:30:38.241" v="3569" actId="14100"/>
@@ -793,7 +786,7 @@
         </pc:grpChg>
       </pc:sldChg>
       <pc:sldChg chg="addSp delSp modSp add mod ord">
-        <pc:chgData name="Amouzou, Komi Mekaeli" userId="020e202c-3c4c-4e52-9bfa-205f5f67fc05" providerId="ADAL" clId="{DFF75377-3DF0-4A60-90BA-EBCBE8F9083E}" dt="2026-01-31T20:09:01.118" v="5527" actId="313"/>
+        <pc:chgData name="Amouzou, Komi Mekaeli" userId="020e202c-3c4c-4e52-9bfa-205f5f67fc05" providerId="ADAL" clId="{DFF75377-3DF0-4A60-90BA-EBCBE8F9083E}" dt="2026-02-01T08:22:15.825" v="5598" actId="20577"/>
         <pc:sldMkLst>
           <pc:docMk/>
           <pc:sldMk cId="2063007720" sldId="260"/>
@@ -1039,21 +1032,13 @@
           </ac:spMkLst>
         </pc:spChg>
         <pc:spChg chg="mod">
-          <ac:chgData name="Amouzou, Komi Mekaeli" userId="020e202c-3c4c-4e52-9bfa-205f5f67fc05" providerId="ADAL" clId="{DFF75377-3DF0-4A60-90BA-EBCBE8F9083E}" dt="2026-01-31T20:09:01.118" v="5527" actId="313"/>
+          <ac:chgData name="Amouzou, Komi Mekaeli" userId="020e202c-3c4c-4e52-9bfa-205f5f67fc05" providerId="ADAL" clId="{DFF75377-3DF0-4A60-90BA-EBCBE8F9083E}" dt="2026-02-01T08:22:15.825" v="5598" actId="20577"/>
           <ac:spMkLst>
             <pc:docMk/>
             <pc:sldMk cId="2063007720" sldId="260"/>
             <ac:spMk id="112" creationId="{667C4828-9D22-3162-838B-1819258A9DD7}"/>
           </ac:spMkLst>
         </pc:spChg>
-        <pc:grpChg chg="add del mod">
-          <ac:chgData name="Amouzou, Komi Mekaeli" userId="020e202c-3c4c-4e52-9bfa-205f5f67fc05" providerId="ADAL" clId="{DFF75377-3DF0-4A60-90BA-EBCBE8F9083E}" dt="2026-01-30T03:16:51.007" v="4659" actId="478"/>
-          <ac:grpSpMkLst>
-            <pc:docMk/>
-            <pc:sldMk cId="2063007720" sldId="260"/>
-            <ac:grpSpMk id="4" creationId="{2D3254DA-A509-C617-9764-822975333F3E}"/>
-          </ac:grpSpMkLst>
-        </pc:grpChg>
         <pc:grpChg chg="add mod">
           <ac:chgData name="Amouzou, Komi Mekaeli" userId="020e202c-3c4c-4e52-9bfa-205f5f67fc05" providerId="ADAL" clId="{DFF75377-3DF0-4A60-90BA-EBCBE8F9083E}" dt="2026-01-30T09:43:24.186" v="4994" actId="164"/>
           <ac:grpSpMkLst>
@@ -1102,44 +1087,12 @@
             <ac:grpSpMk id="15" creationId="{5E1DA03F-8FCA-FA1F-3F1B-F4CDA4F5B0C2}"/>
           </ac:grpSpMkLst>
         </pc:grpChg>
-        <pc:grpChg chg="del mod">
-          <ac:chgData name="Amouzou, Komi Mekaeli" userId="020e202c-3c4c-4e52-9bfa-205f5f67fc05" providerId="ADAL" clId="{DFF75377-3DF0-4A60-90BA-EBCBE8F9083E}" dt="2026-01-30T09:16:44.452" v="4805" actId="165"/>
-          <ac:grpSpMkLst>
-            <pc:docMk/>
-            <pc:sldMk cId="2063007720" sldId="260"/>
-            <ac:grpSpMk id="15" creationId="{669C97E8-8522-F0E4-F3DD-9DB38DF62C08}"/>
-          </ac:grpSpMkLst>
-        </pc:grpChg>
-        <pc:grpChg chg="add del mod">
-          <ac:chgData name="Amouzou, Komi Mekaeli" userId="020e202c-3c4c-4e52-9bfa-205f5f67fc05" providerId="ADAL" clId="{DFF75377-3DF0-4A60-90BA-EBCBE8F9083E}" dt="2026-01-30T09:41:31.907" v="4940" actId="1035"/>
-          <ac:grpSpMkLst>
-            <pc:docMk/>
-            <pc:sldMk cId="2063007720" sldId="260"/>
-            <ac:grpSpMk id="17" creationId="{6B7B73BB-3B08-CBDD-CC50-42F0885C5FF3}"/>
-          </ac:grpSpMkLst>
-        </pc:grpChg>
         <pc:grpChg chg="add mod">
           <ac:chgData name="Amouzou, Komi Mekaeli" userId="020e202c-3c4c-4e52-9bfa-205f5f67fc05" providerId="ADAL" clId="{DFF75377-3DF0-4A60-90BA-EBCBE8F9083E}" dt="2026-01-30T11:12:05.782" v="5130" actId="1035"/>
           <ac:grpSpMkLst>
             <pc:docMk/>
             <pc:sldMk cId="2063007720" sldId="260"/>
             <ac:grpSpMk id="18" creationId="{58382986-69F2-574C-594E-E42943E706D8}"/>
-          </ac:grpSpMkLst>
-        </pc:grpChg>
-        <pc:grpChg chg="add mod">
-          <ac:chgData name="Amouzou, Komi Mekaeli" userId="020e202c-3c4c-4e52-9bfa-205f5f67fc05" providerId="ADAL" clId="{DFF75377-3DF0-4A60-90BA-EBCBE8F9083E}" dt="2026-01-30T09:44:09.527" v="5042" actId="164"/>
-          <ac:grpSpMkLst>
-            <pc:docMk/>
-            <pc:sldMk cId="2063007720" sldId="260"/>
-            <ac:grpSpMk id="19" creationId="{9D3EFD95-8599-66CB-2948-B20E5A70335B}"/>
-          </ac:grpSpMkLst>
-        </pc:grpChg>
-        <pc:grpChg chg="add mod">
-          <ac:chgData name="Amouzou, Komi Mekaeli" userId="020e202c-3c4c-4e52-9bfa-205f5f67fc05" providerId="ADAL" clId="{DFF75377-3DF0-4A60-90BA-EBCBE8F9083E}" dt="2026-01-30T11:05:02.062" v="5080" actId="1036"/>
-          <ac:grpSpMkLst>
-            <pc:docMk/>
-            <pc:sldMk cId="2063007720" sldId="260"/>
-            <ac:grpSpMk id="20" creationId="{C0B341A4-C650-88D6-43C3-205D1C6110E5}"/>
           </ac:grpSpMkLst>
         </pc:grpChg>
         <pc:grpChg chg="add del mod">
@@ -1172,14 +1125,6 @@
             <pc:docMk/>
             <pc:sldMk cId="2063007720" sldId="260"/>
             <ac:grpSpMk id="32" creationId="{9B641BC4-4EF7-3E10-70EE-685342A9EC24}"/>
-          </ac:grpSpMkLst>
-        </pc:grpChg>
-        <pc:grpChg chg="del mod">
-          <ac:chgData name="Amouzou, Komi Mekaeli" userId="020e202c-3c4c-4e52-9bfa-205f5f67fc05" providerId="ADAL" clId="{DFF75377-3DF0-4A60-90BA-EBCBE8F9083E}" dt="2026-01-30T09:13:26.803" v="4732" actId="165"/>
-          <ac:grpSpMkLst>
-            <pc:docMk/>
-            <pc:sldMk cId="2063007720" sldId="260"/>
-            <ac:grpSpMk id="54" creationId="{CD80BCC5-CD4A-8B27-ED50-3237B7BBEC4D}"/>
           </ac:grpSpMkLst>
         </pc:grpChg>
         <pc:grpChg chg="mod">
@@ -1439,7 +1384,7 @@
           <a:p>
             <a:fld id="{7BC05856-D372-4018-954A-406ED84378D1}" type="datetimeFigureOut">
               <a:rPr lang="fr-FR" smtClean="0"/>
-              <a:t>31/01/2026</a:t>
+              <a:t>01/02/2026</a:t>
             </a:fld>
             <a:endParaRPr lang="fr-FR"/>
           </a:p>
@@ -1637,7 +1582,7 @@
           <a:p>
             <a:fld id="{7BC05856-D372-4018-954A-406ED84378D1}" type="datetimeFigureOut">
               <a:rPr lang="fr-FR" smtClean="0"/>
-              <a:t>31/01/2026</a:t>
+              <a:t>01/02/2026</a:t>
             </a:fld>
             <a:endParaRPr lang="fr-FR"/>
           </a:p>
@@ -1845,7 +1790,7 @@
           <a:p>
             <a:fld id="{7BC05856-D372-4018-954A-406ED84378D1}" type="datetimeFigureOut">
               <a:rPr lang="fr-FR" smtClean="0"/>
-              <a:t>31/01/2026</a:t>
+              <a:t>01/02/2026</a:t>
             </a:fld>
             <a:endParaRPr lang="fr-FR"/>
           </a:p>
@@ -2043,7 +1988,7 @@
           <a:p>
             <a:fld id="{7BC05856-D372-4018-954A-406ED84378D1}" type="datetimeFigureOut">
               <a:rPr lang="fr-FR" smtClean="0"/>
-              <a:t>31/01/2026</a:t>
+              <a:t>01/02/2026</a:t>
             </a:fld>
             <a:endParaRPr lang="fr-FR"/>
           </a:p>
@@ -2318,7 +2263,7 @@
           <a:p>
             <a:fld id="{7BC05856-D372-4018-954A-406ED84378D1}" type="datetimeFigureOut">
               <a:rPr lang="fr-FR" smtClean="0"/>
-              <a:t>31/01/2026</a:t>
+              <a:t>01/02/2026</a:t>
             </a:fld>
             <a:endParaRPr lang="fr-FR"/>
           </a:p>
@@ -2583,7 +2528,7 @@
           <a:p>
             <a:fld id="{7BC05856-D372-4018-954A-406ED84378D1}" type="datetimeFigureOut">
               <a:rPr lang="fr-FR" smtClean="0"/>
-              <a:t>31/01/2026</a:t>
+              <a:t>01/02/2026</a:t>
             </a:fld>
             <a:endParaRPr lang="fr-FR"/>
           </a:p>
@@ -2995,7 +2940,7 @@
           <a:p>
             <a:fld id="{7BC05856-D372-4018-954A-406ED84378D1}" type="datetimeFigureOut">
               <a:rPr lang="fr-FR" smtClean="0"/>
-              <a:t>31/01/2026</a:t>
+              <a:t>01/02/2026</a:t>
             </a:fld>
             <a:endParaRPr lang="fr-FR"/>
           </a:p>
@@ -3136,7 +3081,7 @@
           <a:p>
             <a:fld id="{7BC05856-D372-4018-954A-406ED84378D1}" type="datetimeFigureOut">
               <a:rPr lang="fr-FR" smtClean="0"/>
-              <a:t>31/01/2026</a:t>
+              <a:t>01/02/2026</a:t>
             </a:fld>
             <a:endParaRPr lang="fr-FR"/>
           </a:p>
@@ -3249,7 +3194,7 @@
           <a:p>
             <a:fld id="{7BC05856-D372-4018-954A-406ED84378D1}" type="datetimeFigureOut">
               <a:rPr lang="fr-FR" smtClean="0"/>
-              <a:t>31/01/2026</a:t>
+              <a:t>01/02/2026</a:t>
             </a:fld>
             <a:endParaRPr lang="fr-FR"/>
           </a:p>
@@ -3560,7 +3505,7 @@
           <a:p>
             <a:fld id="{7BC05856-D372-4018-954A-406ED84378D1}" type="datetimeFigureOut">
               <a:rPr lang="fr-FR" smtClean="0"/>
-              <a:t>31/01/2026</a:t>
+              <a:t>01/02/2026</a:t>
             </a:fld>
             <a:endParaRPr lang="fr-FR"/>
           </a:p>
@@ -3848,7 +3793,7 @@
           <a:p>
             <a:fld id="{7BC05856-D372-4018-954A-406ED84378D1}" type="datetimeFigureOut">
               <a:rPr lang="fr-FR" smtClean="0"/>
-              <a:t>31/01/2026</a:t>
+              <a:t>01/02/2026</a:t>
             </a:fld>
             <a:endParaRPr lang="fr-FR"/>
           </a:p>
@@ -4089,7 +4034,7 @@
           <a:p>
             <a:fld id="{7BC05856-D372-4018-954A-406ED84378D1}" type="datetimeFigureOut">
               <a:rPr lang="fr-FR" smtClean="0"/>
-              <a:t>31/01/2026</a:t>
+              <a:t>01/02/2026</a:t>
             </a:fld>
             <a:endParaRPr lang="fr-FR"/>
           </a:p>
@@ -9558,7 +9503,7 @@
         <p:spPr>
           <a:xfrm>
             <a:off x="4103432" y="4305095"/>
-            <a:ext cx="3695123" cy="1754326"/>
+            <a:ext cx="3695123" cy="1938992"/>
           </a:xfrm>
           <a:prstGeom prst="rect">
             <a:avLst/>
@@ -9603,7 +9548,7 @@
             </a:pPr>
             <a:r>
               <a:rPr lang="fr-CA" sz="1200" dirty="0"/>
-              <a:t>Multicouche</a:t>
+              <a:t>On peut modifier nb neurones/couches cachées</a:t>
             </a:r>
           </a:p>
           <a:p>
@@ -9613,7 +9558,7 @@
             </a:pPr>
             <a:r>
               <a:rPr lang="fr-CA" sz="1200" dirty="0"/>
-              <a:t>On peut modifier nb neurones/couches cachées</a:t>
+              <a:t>êta modifiable</a:t>
             </a:r>
           </a:p>
           <a:p>
@@ -9622,8 +9567,12 @@
               <a:buChar char="•"/>
             </a:pPr>
             <a:r>
+              <a:rPr lang="fr-CA" sz="1200"/>
+              <a:t>Ajout </a:t>
+            </a:r>
+            <a:r>
               <a:rPr lang="fr-CA" sz="1200" dirty="0"/>
-              <a:t>êta modifiable</a:t>
+              <a:t>option test unitaire</a:t>
             </a:r>
           </a:p>
           <a:p>
@@ -9633,7 +9582,7 @@
             </a:pPr>
             <a:r>
               <a:rPr lang="fr-CA" sz="1200" dirty="0"/>
-              <a:t>possibilité de choisir fichier sources</a:t>
+              <a:t>Enregistrement(ajout/sup/chargement) des configurations (service)</a:t>
             </a:r>
           </a:p>
           <a:p>
@@ -9642,8 +9591,12 @@
               <a:buChar char="•"/>
             </a:pPr>
             <a:r>
-              <a:rPr lang="fr-CA" sz="1200" dirty="0"/>
-              <a:t>Ajout option test unitaire</a:t>
+              <a:rPr lang="fr-CA" sz="1200" dirty="0">
+                <a:highlight>
+                  <a:srgbClr val="FFFF00"/>
+                </a:highlight>
+              </a:rPr>
+              <a:t>Interface</a:t>
             </a:r>
           </a:p>
           <a:p>
@@ -9652,8 +9605,55 @@
               <a:buChar char="•"/>
             </a:pPr>
             <a:r>
-              <a:rPr lang="fr-CA" sz="1200" dirty="0"/>
-              <a:t>Enregistrement(ajout/sup/chargement) des configurations (service)</a:t>
+              <a:rPr lang="fr-CA" sz="1200" dirty="0">
+                <a:highlight>
+                  <a:srgbClr val="FFFF00"/>
+                </a:highlight>
+              </a:rPr>
+              <a:t>Fct </a:t>
+            </a:r>
+            <a:r>
+              <a:rPr lang="fr-CA" sz="1200" dirty="0" err="1">
+                <a:highlight>
+                  <a:srgbClr val="FFFF00"/>
+                </a:highlight>
+              </a:rPr>
+              <a:t>act</a:t>
+            </a:r>
+            <a:r>
+              <a:rPr lang="fr-CA" sz="1200" dirty="0">
+                <a:highlight>
+                  <a:srgbClr val="FFFF00"/>
+                </a:highlight>
+              </a:rPr>
+              <a:t> 2 : </a:t>
+            </a:r>
+            <a:r>
+              <a:rPr lang="fr-CA" sz="1200" dirty="0" err="1">
+                <a:highlight>
+                  <a:srgbClr val="FFFF00"/>
+                </a:highlight>
+              </a:rPr>
+              <a:t>tanh</a:t>
+            </a:r>
+            <a:endParaRPr lang="fr-CA" sz="1200" dirty="0">
+              <a:highlight>
+                <a:srgbClr val="FFFF00"/>
+              </a:highlight>
+            </a:endParaRPr>
+          </a:p>
+          <a:p>
+            <a:pPr marL="171450" indent="-171450">
+              <a:buFont typeface="Arial" panose="020B0604020202020204" pitchFamily="34" charset="0"/>
+              <a:buChar char="•"/>
+            </a:pPr>
+            <a:r>
+              <a:rPr lang="fr-CA" sz="1200" dirty="0">
+                <a:highlight>
+                  <a:srgbClr val="FFFF00"/>
+                </a:highlight>
+              </a:rPr>
+              <a:t>Plusieurs couches cachées </a:t>
             </a:r>
           </a:p>
         </p:txBody>

</xml_diff>